<commit_message>
Changed a few formatting.
</commit_message>
<xml_diff>
--- a/ kinect-virtual-world --username c.c.williams55@gmail.com/Report 1 Files/Angry Prims Preliminary Proposal.pptx
+++ b/ kinect-virtual-world --username c.c.williams55@gmail.com/Report 1 Files/Angry Prims Preliminary Proposal.pptx
@@ -115,7 +115,7 @@
   </p:defaultTextStyle>
   <p:extLst>
     <p:ext uri="{521415D9-36F7-43E2-AB2F-B90AF26B5E84}">
-      <p14:sectionLst xmlns:p14="http://schemas.microsoft.com/office/powerpoint/2010/main" xmlns="">
+      <p14:sectionLst xmlns="" xmlns:p14="http://schemas.microsoft.com/office/powerpoint/2010/main">
         <p14:section name="Default Section" id="{992832F5-EA01-48E5-B403-87E193F50680}">
           <p14:sldIdLst>
             <p14:sldId id="259"/>
@@ -2090,9 +2090,9 @@
   <dgm:cxnLst>
     <dgm:cxn modelId="{2583541F-F162-483D-B9B2-385C14B7D6E2}" type="presOf" srcId="{9898FE38-DE6C-46BA-8D32-D767674AD978}" destId="{5E71A06C-9747-4CAE-BA21-E9C2A4D6678D}" srcOrd="0" destOrd="1" presId="urn:microsoft.com/office/officeart/2005/8/layout/arrow2"/>
     <dgm:cxn modelId="{6686FD9E-DB1E-41A9-BB5F-188F3F8748F3}" type="presOf" srcId="{A39C9339-F7BC-4A9F-AF8A-3B9741B27413}" destId="{48F9B62B-8095-40B1-882D-7B164B0C8B69}" srcOrd="0" destOrd="1" presId="urn:microsoft.com/office/officeart/2005/8/layout/arrow2"/>
-    <dgm:cxn modelId="{39ECB7E7-30E3-4A3C-AAF0-553A3160CF23}" type="presOf" srcId="{455C831A-CCF5-4391-A2BE-9DF065D37587}" destId="{E220828C-C958-4FCF-B52F-02D7F5D17607}" srcOrd="0" destOrd="0" presId="urn:microsoft.com/office/officeart/2005/8/layout/arrow2"/>
     <dgm:cxn modelId="{277398F3-A9DD-4822-A4A0-9408AA94EB41}" srcId="{A75DE5EA-0E88-4A1C-B1EA-B4EE477D7AA1}" destId="{9898FE38-DE6C-46BA-8D32-D767674AD978}" srcOrd="0" destOrd="0" parTransId="{6500A968-9A0E-4ACA-91E4-A3C5FA03BCC8}" sibTransId="{15E99FBC-5B51-4114-8E0B-C26E50C78603}"/>
     <dgm:cxn modelId="{8C1AFE23-B091-4CE6-8284-0511812F213B}" srcId="{455C831A-CCF5-4391-A2BE-9DF065D37587}" destId="{1E3A074B-8EC3-4AC7-ADB8-C53A583CA2D1}" srcOrd="0" destOrd="0" parTransId="{C3E70DF8-D297-401F-A070-1295F4388B0B}" sibTransId="{13D421C7-F834-4141-85ED-0207D610A128}"/>
+    <dgm:cxn modelId="{39ECB7E7-30E3-4A3C-AAF0-553A3160CF23}" type="presOf" srcId="{455C831A-CCF5-4391-A2BE-9DF065D37587}" destId="{E220828C-C958-4FCF-B52F-02D7F5D17607}" srcOrd="0" destOrd="0" presId="urn:microsoft.com/office/officeart/2005/8/layout/arrow2"/>
     <dgm:cxn modelId="{FDF899A6-3BC3-4400-9E4F-5AFB1A844A3B}" type="presOf" srcId="{BAD6DE81-DE4F-40EF-8526-A8F127A4BE33}" destId="{DB2CD8C7-A5B3-49A1-81CC-0EEDDDF3DB4E}" srcOrd="0" destOrd="1" presId="urn:microsoft.com/office/officeart/2005/8/layout/arrow2"/>
     <dgm:cxn modelId="{BF777ED0-A485-405A-BFCD-E378EF965464}" srcId="{1E3A074B-8EC3-4AC7-ADB8-C53A583CA2D1}" destId="{A39C9339-F7BC-4A9F-AF8A-3B9741B27413}" srcOrd="0" destOrd="0" parTransId="{26699644-3B9B-4794-926C-D854282146D8}" sibTransId="{3E2FBE5E-2D29-4C39-97D1-424264F1308F}"/>
     <dgm:cxn modelId="{3C905DEF-E67D-4C40-B05D-4060669E3B98}" type="presOf" srcId="{A75DE5EA-0E88-4A1C-B1EA-B4EE477D7AA1}" destId="{5E71A06C-9747-4CAE-BA21-E9C2A4D6678D}" srcOrd="0" destOrd="0" presId="urn:microsoft.com/office/officeart/2005/8/layout/arrow2"/>
@@ -8922,7 +8922,7 @@
     </p:spTree>
     <p:extLst>
       <p:ext uri="{BB962C8B-B14F-4D97-AF65-F5344CB8AC3E}">
-        <p14:creationId xmlns:p14="http://schemas.microsoft.com/office/powerpoint/2010/main" xmlns="" val="650118158"/>
+        <p14:creationId xmlns="" xmlns:p14="http://schemas.microsoft.com/office/powerpoint/2010/main" val="650118158"/>
       </p:ext>
     </p:extLst>
   </p:cSld>
@@ -9945,7 +9945,7 @@
           <a:blip r:embed="rId2" cstate="email">
             <a:extLst>
               <a:ext uri="{28A0092B-C50C-407E-A947-70E740481C1C}">
-                <a14:useLocalDpi xmlns:a14="http://schemas.microsoft.com/office/drawing/2010/main" xmlns=""/>
+                <a14:useLocalDpi xmlns="" xmlns:a14="http://schemas.microsoft.com/office/drawing/2010/main"/>
               </a:ext>
             </a:extLst>
           </a:blip>
@@ -9975,7 +9975,7 @@
           <a:blip r:embed="rId3" cstate="email">
             <a:extLst>
               <a:ext uri="{28A0092B-C50C-407E-A947-70E740481C1C}">
-                <a14:useLocalDpi xmlns:a14="http://schemas.microsoft.com/office/drawing/2010/main" xmlns=""/>
+                <a14:useLocalDpi xmlns="" xmlns:a14="http://schemas.microsoft.com/office/drawing/2010/main"/>
               </a:ext>
             </a:extLst>
           </a:blip>
@@ -10014,7 +10014,7 @@
           <a:blip r:embed="rId4" cstate="email">
             <a:extLst>
               <a:ext uri="{28A0092B-C50C-407E-A947-70E740481C1C}">
-                <a14:useLocalDpi xmlns:a14="http://schemas.microsoft.com/office/drawing/2010/main" xmlns=""/>
+                <a14:useLocalDpi xmlns="" xmlns:a14="http://schemas.microsoft.com/office/drawing/2010/main"/>
               </a:ext>
             </a:extLst>
           </a:blip>
@@ -10053,7 +10053,7 @@
           <a:blip r:embed="rId5" cstate="email">
             <a:extLst>
               <a:ext uri="{28A0092B-C50C-407E-A947-70E740481C1C}">
-                <a14:useLocalDpi xmlns:a14="http://schemas.microsoft.com/office/drawing/2010/main" xmlns=""/>
+                <a14:useLocalDpi xmlns="" xmlns:a14="http://schemas.microsoft.com/office/drawing/2010/main"/>
               </a:ext>
             </a:extLst>
           </a:blip>
@@ -11316,7 +11316,7 @@
           <a:blip r:embed="rId3" cstate="email">
             <a:extLst>
               <a:ext uri="{28A0092B-C50C-407E-A947-70E740481C1C}">
-                <a14:useLocalDpi xmlns:a14="http://schemas.microsoft.com/office/drawing/2010/main" xmlns=""/>
+                <a14:useLocalDpi xmlns="" xmlns:a14="http://schemas.microsoft.com/office/drawing/2010/main"/>
               </a:ext>
             </a:extLst>
           </a:blip>
@@ -14439,20 +14439,12 @@
               <a:rPr lang="en-US" sz="5500" b="1" i="1" dirty="0" smtClean="0"/>
               <a:t> </a:t>
             </a:r>
-            <a:r>
-              <a:rPr lang="en-US" sz="5500" b="1" i="1" dirty="0" smtClean="0"/>
-              <a:t/>
-            </a:r>
             <a:br>
               <a:rPr lang="en-US" sz="5500" b="1" i="1" dirty="0" smtClean="0"/>
             </a:br>
             <a:r>
               <a:rPr lang="en-US" sz="5500" b="1" i="1" dirty="0" smtClean="0"/>
-              <a:t>Preliminary </a:t>
-            </a:r>
-            <a:r>
-              <a:rPr lang="en-US" sz="5500" b="1" i="1" dirty="0" smtClean="0"/>
-              <a:t>Proposal</a:t>
+              <a:t>Preliminary Proposal</a:t>
             </a:r>
             <a:endParaRPr lang="en-US" sz="5500" b="1" i="1" dirty="0"/>
           </a:p>
@@ -14490,24 +14482,15 @@
             <a:pPr algn="ctr"/>
             <a:r>
               <a:rPr lang="en-US" dirty="0" smtClean="0"/>
-              <a:t>Christian </a:t>
-            </a:r>
-            <a:r>
-              <a:rPr lang="en-US" dirty="0" smtClean="0"/>
-              <a:t>Williams</a:t>
+              <a:t>Christian Williams</a:t>
             </a:r>
           </a:p>
           <a:p>
             <a:pPr algn="ctr"/>
             <a:r>
               <a:rPr lang="en-US" dirty="0" smtClean="0"/>
-              <a:t>Francis </a:t>
+              <a:t>Francis Sabado</a:t>
             </a:r>
-            <a:r>
-              <a:rPr lang="en-US" dirty="0" smtClean="0"/>
-              <a:t>Sabado</a:t>
-            </a:r>
-            <a:endParaRPr lang="en-US" dirty="0" smtClean="0"/>
           </a:p>
           <a:p>
             <a:pPr algn="ctr"/>
@@ -14517,11 +14500,7 @@
             </a:r>
             <a:r>
               <a:rPr lang="en-US" dirty="0" err="1" smtClean="0"/>
-              <a:t>M</a:t>
-            </a:r>
-            <a:r>
-              <a:rPr lang="en-US" dirty="0" err="1" smtClean="0"/>
-              <a:t>ahmoud</a:t>
+              <a:t>Mahmoud</a:t>
             </a:r>
             <a:endParaRPr lang="en-US" dirty="0" smtClean="0"/>
           </a:p>
@@ -14533,25 +14512,15 @@
             <a:pPr algn="ctr"/>
             <a:r>
               <a:rPr lang="en-US" dirty="0" smtClean="0"/>
-              <a:t>University of </a:t>
+              <a:t>University of Arkansas</a:t>
             </a:r>
-            <a:r>
-              <a:rPr lang="en-US" dirty="0" smtClean="0"/>
-              <a:t>Arkansas</a:t>
-            </a:r>
-            <a:endParaRPr lang="en-US" dirty="0" smtClean="0"/>
           </a:p>
           <a:p>
             <a:pPr algn="ctr"/>
             <a:r>
               <a:rPr lang="en-US" dirty="0" smtClean="0"/>
-              <a:t>25 Oct </a:t>
+              <a:t>25 Oct 2011</a:t>
             </a:r>
-            <a:r>
-              <a:rPr lang="en-US" dirty="0" smtClean="0"/>
-              <a:t>2011</a:t>
-            </a:r>
-            <a:endParaRPr lang="en-US" dirty="0" smtClean="0"/>
           </a:p>
         </p:txBody>
       </p:sp>
@@ -14678,7 +14647,7 @@
           <a:blip r:embed="rId4" cstate="print">
             <a:extLst>
               <a:ext uri="{28A0092B-C50C-407E-A947-70E740481C1C}">
-                <a14:useLocalDpi xmlns:a14="http://schemas.microsoft.com/office/drawing/2010/main" xmlns="" val="0"/>
+                <a14:useLocalDpi xmlns="" xmlns:a14="http://schemas.microsoft.com/office/drawing/2010/main" val="0"/>
               </a:ext>
             </a:extLst>
           </a:blip>
@@ -14698,7 +14667,7 @@
           <a:noFill/>
           <a:extLst>
             <a:ext uri="{909E8E84-426E-40DD-AFC4-6F175D3DCCD1}">
-              <a14:hiddenFill xmlns:a14="http://schemas.microsoft.com/office/drawing/2010/main" xmlns="">
+              <a14:hiddenFill xmlns="" xmlns:a14="http://schemas.microsoft.com/office/drawing/2010/main">
                 <a:solidFill>
                   <a:srgbClr val="FFFFFF"/>
                 </a:solidFill>
@@ -14719,7 +14688,7 @@
           <a:blip r:embed="rId5" cstate="email">
             <a:extLst>
               <a:ext uri="{28A0092B-C50C-407E-A947-70E740481C1C}">
-                <a14:useLocalDpi xmlns:a14="http://schemas.microsoft.com/office/drawing/2010/main" xmlns="" val="0"/>
+                <a14:useLocalDpi xmlns="" xmlns:a14="http://schemas.microsoft.com/office/drawing/2010/main" val="0"/>
               </a:ext>
             </a:extLst>
           </a:blip>
@@ -14739,7 +14708,7 @@
           <a:noFill/>
           <a:extLst>
             <a:ext uri="{909E8E84-426E-40DD-AFC4-6F175D3DCCD1}">
-              <a14:hiddenFill xmlns:a14="http://schemas.microsoft.com/office/drawing/2010/main" xmlns="">
+              <a14:hiddenFill xmlns="" xmlns:a14="http://schemas.microsoft.com/office/drawing/2010/main">
                 <a:solidFill>
                   <a:srgbClr val="FFFFFF"/>
                 </a:solidFill>
@@ -14911,7 +14880,28 @@
             </a:pPr>
             <a:r>
               <a:rPr lang="en-US" dirty="0" smtClean="0"/>
-              <a:t>Need to develop the game sequence: Start, End, Restart</a:t>
+              <a:t>Need to develop the game sequence</a:t>
+            </a:r>
+            <a:r>
+              <a:rPr lang="en-US" smtClean="0"/>
+              <a:t>: </a:t>
+            </a:r>
+            <a:endParaRPr lang="en-US" smtClean="0"/>
+          </a:p>
+          <a:p>
+            <a:pPr lvl="2">
+              <a:lnSpc>
+                <a:spcPct val="150000"/>
+              </a:lnSpc>
+              <a:buNone/>
+            </a:pPr>
+            <a:r>
+              <a:rPr lang="en-US" dirty="0" smtClean="0"/>
+              <a:t>Start</a:t>
+            </a:r>
+            <a:r>
+              <a:rPr lang="en-US" dirty="0" smtClean="0"/>
+              <a:t>, End, Restart</a:t>
             </a:r>
             <a:endParaRPr lang="en-US" dirty="0"/>
           </a:p>
@@ -14968,7 +14958,7 @@
           <p:nvPr>
             <p:extLst>
               <p:ext uri="{D42A27DB-BD31-4B8C-83A1-F6EECF244321}">
-                <p14:modId xmlns:p14="http://schemas.microsoft.com/office/powerpoint/2010/main" xmlns="" val="1070010873"/>
+                <p14:modId xmlns="" xmlns:p14="http://schemas.microsoft.com/office/powerpoint/2010/main" val="1070010873"/>
               </p:ext>
             </p:extLst>
           </p:nvPr>
@@ -15631,7 +15621,7 @@
         <p:spPr>
           <a:xfrm>
             <a:off x="457200" y="1828800"/>
-            <a:ext cx="5562600" cy="4297363"/>
+            <a:ext cx="5257800" cy="4297363"/>
           </a:xfrm>
         </p:spPr>
         <p:txBody>
@@ -15680,7 +15670,28 @@
             </a:pPr>
             <a:r>
               <a:rPr lang="en-US" dirty="0" smtClean="0"/>
-              <a:t>Full Modeling game and source code then Full remake game and source code </a:t>
+              <a:t>Full Modeling game and source code </a:t>
+            </a:r>
+            <a:endParaRPr lang="en-US" dirty="0" smtClean="0"/>
+          </a:p>
+          <a:p>
+            <a:pPr>
+              <a:lnSpc>
+                <a:spcPct val="150000"/>
+              </a:lnSpc>
+              <a:buNone/>
+            </a:pPr>
+            <a:r>
+              <a:rPr lang="en-US" dirty="0" smtClean="0"/>
+              <a:t>	</a:t>
+            </a:r>
+            <a:r>
+              <a:rPr lang="en-US" dirty="0" smtClean="0"/>
+              <a:t>then </a:t>
+            </a:r>
+            <a:r>
+              <a:rPr lang="en-US" dirty="0" smtClean="0"/>
+              <a:t>Full remake game and source code </a:t>
             </a:r>
           </a:p>
           <a:p>
@@ -15731,7 +15742,7 @@
           <a:blip r:embed="rId5" cstate="print">
             <a:extLst>
               <a:ext uri="{28A0092B-C50C-407E-A947-70E740481C1C}">
-                <a14:useLocalDpi xmlns:a14="http://schemas.microsoft.com/office/drawing/2010/main" xmlns="" val="0"/>
+                <a14:useLocalDpi xmlns="" xmlns:a14="http://schemas.microsoft.com/office/drawing/2010/main" val="0"/>
               </a:ext>
             </a:extLst>
           </a:blip>
@@ -15751,7 +15762,7 @@
           <a:noFill/>
           <a:extLst>
             <a:ext uri="{909E8E84-426E-40DD-AFC4-6F175D3DCCD1}">
-              <a14:hiddenFill xmlns:a14="http://schemas.microsoft.com/office/drawing/2010/main" xmlns="">
+              <a14:hiddenFill xmlns="" xmlns:a14="http://schemas.microsoft.com/office/drawing/2010/main">
                 <a:solidFill>
                   <a:srgbClr val="FFFFFF"/>
                 </a:solidFill>
@@ -15844,7 +15855,7 @@
             </p:custDataLst>
             <p:extLst>
               <p:ext uri="{D42A27DB-BD31-4B8C-83A1-F6EECF244321}">
-                <p14:modId xmlns:p14="http://schemas.microsoft.com/office/powerpoint/2010/main" xmlns="" val="885836537"/>
+                <p14:modId xmlns="" xmlns:p14="http://schemas.microsoft.com/office/powerpoint/2010/main" val="885836537"/>
               </p:ext>
             </p:extLst>
           </p:nvPr>
@@ -16087,7 +16098,7 @@
     </p:spTree>
     <p:extLst>
       <p:ext uri="{BB962C8B-B14F-4D97-AF65-F5344CB8AC3E}">
-        <p14:creationId xmlns:p14="http://schemas.microsoft.com/office/powerpoint/2010/main" xmlns="" val="1933149179"/>
+        <p14:creationId xmlns="" xmlns:p14="http://schemas.microsoft.com/office/powerpoint/2010/main" val="1933149179"/>
       </p:ext>
     </p:extLst>
   </p:cSld>

</xml_diff>

<commit_message>
Powerpoint: Updated some formatting. Added some changes to make it clear.
Document:
Updated
</commit_message>
<xml_diff>
--- a/ kinect-virtual-world --username c.c.williams55@gmail.com/Report 1 Files/Angry Prims Preliminary Proposal.pptx
+++ b/ kinect-virtual-world --username c.c.williams55@gmail.com/Report 1 Files/Angry Prims Preliminary Proposal.pptx
@@ -115,7 +115,7 @@
   </p:defaultTextStyle>
   <p:extLst>
     <p:ext uri="{521415D9-36F7-43E2-AB2F-B90AF26B5E84}">
-      <p14:sectionLst xmlns:p14="http://schemas.microsoft.com/office/powerpoint/2010/main">
+      <p14:sectionLst xmlns:p14="http://schemas.microsoft.com/office/powerpoint/2010/main" xmlns="">
         <p14:section name="Default Section" id="{992832F5-EA01-48E5-B403-87E193F50680}">
           <p14:sldIdLst>
             <p14:sldId id="259"/>
@@ -1003,11 +1003,7 @@
           </a:r>
           <a:r>
             <a:rPr lang="en-US" sz="1300" b="1" spc="-10" baseline="0" dirty="0" smtClean="0"/>
-            <a:t> </a:t>
-          </a:r>
-          <a:r>
-            <a:rPr lang="en-US" sz="1300" b="1" spc="-10" baseline="0" dirty="0" smtClean="0"/>
-            <a:t>Client and Gestures</a:t>
+            <a:t> Client and Gestures</a:t>
           </a:r>
           <a:endParaRPr lang="en-US" sz="1300" b="1" spc="-10" baseline="0" dirty="0"/>
         </a:p>
@@ -1368,29 +1364,29 @@
     </dgm:pt>
   </dgm:ptLst>
   <dgm:cxnLst>
+    <dgm:cxn modelId="{54B2FED9-9F5A-482C-B7AD-CE780DBB4D7A}" type="presOf" srcId="{ED3CCD02-8D75-4A08-AD85-C5F828B29313}" destId="{E09D1B4B-09AE-4B1F-A409-CE344F8F9185}" srcOrd="0" destOrd="0" presId="urn:microsoft.com/office/officeart/2005/8/layout/radial5"/>
+    <dgm:cxn modelId="{DF0DC324-3E24-4C19-A1FD-DD9570009774}" type="presOf" srcId="{9A038BAD-1DAA-4E08-AF5C-7A535C3A31A3}" destId="{492A8904-4F29-41B2-8DF6-9E5DB43B598E}" srcOrd="0" destOrd="0" presId="urn:microsoft.com/office/officeart/2005/8/layout/radial5"/>
+    <dgm:cxn modelId="{7362BBE9-CE05-48ED-9B0F-19744BB7FA24}" type="presOf" srcId="{CFE62A0D-AFCB-42FF-A2F7-4127DE6E4A06}" destId="{5E3992B2-2FF9-4710-BC5D-D3CABAC0944B}" srcOrd="1" destOrd="0" presId="urn:microsoft.com/office/officeart/2005/8/layout/radial5"/>
+    <dgm:cxn modelId="{D455749F-4F4C-4295-A229-F1CAA9A84B33}" type="presOf" srcId="{C2B16F5E-4FD9-4E6C-984C-5FB34252F788}" destId="{A0AE6ABD-EFF8-41C2-907C-790C07DF522C}" srcOrd="0" destOrd="0" presId="urn:microsoft.com/office/officeart/2005/8/layout/radial5"/>
+    <dgm:cxn modelId="{26D1578F-8BE0-4DFF-B5B7-36D919C7DF48}" type="presOf" srcId="{19675BB5-4BE3-4E06-B2B3-AAA3D107C1A8}" destId="{EB09D521-9D02-4B4D-80CB-EB847731A63E}" srcOrd="0" destOrd="0" presId="urn:microsoft.com/office/officeart/2005/8/layout/radial5"/>
+    <dgm:cxn modelId="{29FA02FA-E640-4261-806B-AA21CEF811C3}" type="presOf" srcId="{E1D6882F-7F41-4B9B-8326-079D0B7775D3}" destId="{FB0FDE60-5A66-47CD-855C-10B0ABFAFF6D}" srcOrd="0" destOrd="0" presId="urn:microsoft.com/office/officeart/2005/8/layout/radial5"/>
+    <dgm:cxn modelId="{F98C9256-0E52-4294-AA5B-17A525F41415}" type="presOf" srcId="{813DB034-1CFA-4CE1-8536-6BC256192226}" destId="{60779230-642B-46DB-B5CA-FC2220C38859}" srcOrd="0" destOrd="0" presId="urn:microsoft.com/office/officeart/2005/8/layout/radial5"/>
+    <dgm:cxn modelId="{41966F54-3C25-450E-8104-04B2B9165959}" srcId="{D3864EA6-13E7-440F-948B-8118F5878A44}" destId="{813DB034-1CFA-4CE1-8536-6BC256192226}" srcOrd="0" destOrd="0" parTransId="{ED3CCD02-8D75-4A08-AD85-C5F828B29313}" sibTransId="{F3516F2D-4619-4753-A81E-130803DFBFC7}"/>
+    <dgm:cxn modelId="{7598B8A9-9332-4A2B-B5D9-CF010EBBDF46}" type="presOf" srcId="{8F21B166-5620-46A8-A5DD-72EAE361E61D}" destId="{8C992717-B056-4E89-850B-547F00D86B47}" srcOrd="1" destOrd="0" presId="urn:microsoft.com/office/officeart/2005/8/layout/radial5"/>
+    <dgm:cxn modelId="{D74F0E62-DE98-4010-8B2E-1EAAA9E56350}" type="presOf" srcId="{14E5A95F-9DC9-4E33-B709-14C57323ACAA}" destId="{0B5562C5-56E9-4F94-AD9A-09B6AA6E206F}" srcOrd="0" destOrd="0" presId="urn:microsoft.com/office/officeart/2005/8/layout/radial5"/>
     <dgm:cxn modelId="{5EBF790F-CC7C-4BBA-98A7-614FB5283795}" srcId="{D3864EA6-13E7-440F-948B-8118F5878A44}" destId="{6461E40C-FAF1-4C11-9CA4-01B7756558A8}" srcOrd="1" destOrd="0" parTransId="{5418FCE5-0AC2-479F-8F47-D35F7A60BD8D}" sibTransId="{3D67A8BA-4FB2-401F-A3C1-92132B645061}"/>
+    <dgm:cxn modelId="{7834DFDC-DD97-4D0F-B547-27AB53428B4B}" srcId="{19675BB5-4BE3-4E06-B2B3-AAA3D107C1A8}" destId="{D3864EA6-13E7-440F-948B-8118F5878A44}" srcOrd="0" destOrd="0" parTransId="{5F920266-1B6A-4D7D-8C8B-D20E2934BF67}" sibTransId="{F4FE127A-F33D-4F59-961D-A505D5A781EE}"/>
+    <dgm:cxn modelId="{7EB75183-B20B-4EE8-AF71-83BA84E1BE0D}" type="presOf" srcId="{8F21B166-5620-46A8-A5DD-72EAE361E61D}" destId="{470BEB95-5498-4076-A7AD-52EA2D6058A0}" srcOrd="0" destOrd="0" presId="urn:microsoft.com/office/officeart/2005/8/layout/radial5"/>
     <dgm:cxn modelId="{F383A1C8-295E-4F6E-9C5D-67AA4DB4F7EB}" type="presOf" srcId="{ED3CCD02-8D75-4A08-AD85-C5F828B29313}" destId="{79A2186A-8429-4E95-A4D2-214813090081}" srcOrd="1" destOrd="0" presId="urn:microsoft.com/office/officeart/2005/8/layout/radial5"/>
-    <dgm:cxn modelId="{54B2FED9-9F5A-482C-B7AD-CE780DBB4D7A}" type="presOf" srcId="{ED3CCD02-8D75-4A08-AD85-C5F828B29313}" destId="{E09D1B4B-09AE-4B1F-A409-CE344F8F9185}" srcOrd="0" destOrd="0" presId="urn:microsoft.com/office/officeart/2005/8/layout/radial5"/>
-    <dgm:cxn modelId="{7834DFDC-DD97-4D0F-B547-27AB53428B4B}" srcId="{19675BB5-4BE3-4E06-B2B3-AAA3D107C1A8}" destId="{D3864EA6-13E7-440F-948B-8118F5878A44}" srcOrd="0" destOrd="0" parTransId="{5F920266-1B6A-4D7D-8C8B-D20E2934BF67}" sibTransId="{F4FE127A-F33D-4F59-961D-A505D5A781EE}"/>
+    <dgm:cxn modelId="{4D341991-5DB3-4739-89C1-0B6A24A114E8}" type="presOf" srcId="{5418FCE5-0AC2-479F-8F47-D35F7A60BD8D}" destId="{4873F644-A37B-4263-BDD3-7D4AECF93436}" srcOrd="0" destOrd="0" presId="urn:microsoft.com/office/officeart/2005/8/layout/radial5"/>
+    <dgm:cxn modelId="{67029EA3-AC4E-48C5-87CF-57A4733799CA}" type="presOf" srcId="{E1D6882F-7F41-4B9B-8326-079D0B7775D3}" destId="{D9C29361-9907-4AA5-9D4C-465D8E4516DA}" srcOrd="1" destOrd="0" presId="urn:microsoft.com/office/officeart/2005/8/layout/radial5"/>
+    <dgm:cxn modelId="{B78770BC-227B-404F-8185-2F70ECA32605}" srcId="{D3864EA6-13E7-440F-948B-8118F5878A44}" destId="{14E5A95F-9DC9-4E33-B709-14C57323ACAA}" srcOrd="2" destOrd="0" parTransId="{CFE62A0D-AFCB-42FF-A2F7-4127DE6E4A06}" sibTransId="{87455A86-154D-4572-BF6D-F5FEBED08194}"/>
     <dgm:cxn modelId="{33CA9426-6028-4F9E-ADDB-AA3042A81F7D}" type="presOf" srcId="{6461E40C-FAF1-4C11-9CA4-01B7756558A8}" destId="{8FE55D76-69B8-469D-BE4A-A0F9F69D5110}" srcOrd="0" destOrd="0" presId="urn:microsoft.com/office/officeart/2005/8/layout/radial5"/>
-    <dgm:cxn modelId="{29FA02FA-E640-4261-806B-AA21CEF811C3}" type="presOf" srcId="{E1D6882F-7F41-4B9B-8326-079D0B7775D3}" destId="{FB0FDE60-5A66-47CD-855C-10B0ABFAFF6D}" srcOrd="0" destOrd="0" presId="urn:microsoft.com/office/officeart/2005/8/layout/radial5"/>
+    <dgm:cxn modelId="{459BE59C-8527-4040-AA6D-E00460E9E8BD}" type="presOf" srcId="{D3864EA6-13E7-440F-948B-8118F5878A44}" destId="{7ADCFBEC-172E-41BB-B545-FE2085E0B744}" srcOrd="0" destOrd="0" presId="urn:microsoft.com/office/officeart/2005/8/layout/radial5"/>
+    <dgm:cxn modelId="{F20E6E35-2EF6-49E1-BCE2-AF737813AC7F}" srcId="{D3864EA6-13E7-440F-948B-8118F5878A44}" destId="{C2B16F5E-4FD9-4E6C-984C-5FB34252F788}" srcOrd="4" destOrd="0" parTransId="{8F21B166-5620-46A8-A5DD-72EAE361E61D}" sibTransId="{D972BA52-9B06-4D48-9819-200C1326EA4D}"/>
+    <dgm:cxn modelId="{F67B8136-3A2B-408C-9570-C50B3786C6D1}" srcId="{D3864EA6-13E7-440F-948B-8118F5878A44}" destId="{9A038BAD-1DAA-4E08-AF5C-7A535C3A31A3}" srcOrd="3" destOrd="0" parTransId="{E1D6882F-7F41-4B9B-8326-079D0B7775D3}" sibTransId="{BF904E21-59DA-42DB-BE7C-359EAF11BFDB}"/>
+    <dgm:cxn modelId="{33010AF7-9670-4113-8A43-897FBCF42E9F}" type="presOf" srcId="{CFE62A0D-AFCB-42FF-A2F7-4127DE6E4A06}" destId="{8999D690-D432-4F1A-B2AE-D98A61E6F24A}" srcOrd="0" destOrd="0" presId="urn:microsoft.com/office/officeart/2005/8/layout/radial5"/>
     <dgm:cxn modelId="{9D61B47E-7F41-4639-962A-9097B26F323C}" type="presOf" srcId="{5418FCE5-0AC2-479F-8F47-D35F7A60BD8D}" destId="{AF2E0478-D773-4966-9A95-8E70AD7139B7}" srcOrd="1" destOrd="0" presId="urn:microsoft.com/office/officeart/2005/8/layout/radial5"/>
-    <dgm:cxn modelId="{F20E6E35-2EF6-49E1-BCE2-AF737813AC7F}" srcId="{D3864EA6-13E7-440F-948B-8118F5878A44}" destId="{C2B16F5E-4FD9-4E6C-984C-5FB34252F788}" srcOrd="4" destOrd="0" parTransId="{8F21B166-5620-46A8-A5DD-72EAE361E61D}" sibTransId="{D972BA52-9B06-4D48-9819-200C1326EA4D}"/>
-    <dgm:cxn modelId="{7362BBE9-CE05-48ED-9B0F-19744BB7FA24}" type="presOf" srcId="{CFE62A0D-AFCB-42FF-A2F7-4127DE6E4A06}" destId="{5E3992B2-2FF9-4710-BC5D-D3CABAC0944B}" srcOrd="1" destOrd="0" presId="urn:microsoft.com/office/officeart/2005/8/layout/radial5"/>
-    <dgm:cxn modelId="{67029EA3-AC4E-48C5-87CF-57A4733799CA}" type="presOf" srcId="{E1D6882F-7F41-4B9B-8326-079D0B7775D3}" destId="{D9C29361-9907-4AA5-9D4C-465D8E4516DA}" srcOrd="1" destOrd="0" presId="urn:microsoft.com/office/officeart/2005/8/layout/radial5"/>
-    <dgm:cxn modelId="{DF0DC324-3E24-4C19-A1FD-DD9570009774}" type="presOf" srcId="{9A038BAD-1DAA-4E08-AF5C-7A535C3A31A3}" destId="{492A8904-4F29-41B2-8DF6-9E5DB43B598E}" srcOrd="0" destOrd="0" presId="urn:microsoft.com/office/officeart/2005/8/layout/radial5"/>
-    <dgm:cxn modelId="{459BE59C-8527-4040-AA6D-E00460E9E8BD}" type="presOf" srcId="{D3864EA6-13E7-440F-948B-8118F5878A44}" destId="{7ADCFBEC-172E-41BB-B545-FE2085E0B744}" srcOrd="0" destOrd="0" presId="urn:microsoft.com/office/officeart/2005/8/layout/radial5"/>
-    <dgm:cxn modelId="{26D1578F-8BE0-4DFF-B5B7-36D919C7DF48}" type="presOf" srcId="{19675BB5-4BE3-4E06-B2B3-AAA3D107C1A8}" destId="{EB09D521-9D02-4B4D-80CB-EB847731A63E}" srcOrd="0" destOrd="0" presId="urn:microsoft.com/office/officeart/2005/8/layout/radial5"/>
-    <dgm:cxn modelId="{41966F54-3C25-450E-8104-04B2B9165959}" srcId="{D3864EA6-13E7-440F-948B-8118F5878A44}" destId="{813DB034-1CFA-4CE1-8536-6BC256192226}" srcOrd="0" destOrd="0" parTransId="{ED3CCD02-8D75-4A08-AD85-C5F828B29313}" sibTransId="{F3516F2D-4619-4753-A81E-130803DFBFC7}"/>
-    <dgm:cxn modelId="{B78770BC-227B-404F-8185-2F70ECA32605}" srcId="{D3864EA6-13E7-440F-948B-8118F5878A44}" destId="{14E5A95F-9DC9-4E33-B709-14C57323ACAA}" srcOrd="2" destOrd="0" parTransId="{CFE62A0D-AFCB-42FF-A2F7-4127DE6E4A06}" sibTransId="{87455A86-154D-4572-BF6D-F5FEBED08194}"/>
-    <dgm:cxn modelId="{4D341991-5DB3-4739-89C1-0B6A24A114E8}" type="presOf" srcId="{5418FCE5-0AC2-479F-8F47-D35F7A60BD8D}" destId="{4873F644-A37B-4263-BDD3-7D4AECF93436}" srcOrd="0" destOrd="0" presId="urn:microsoft.com/office/officeart/2005/8/layout/radial5"/>
-    <dgm:cxn modelId="{7598B8A9-9332-4A2B-B5D9-CF010EBBDF46}" type="presOf" srcId="{8F21B166-5620-46A8-A5DD-72EAE361E61D}" destId="{8C992717-B056-4E89-850B-547F00D86B47}" srcOrd="1" destOrd="0" presId="urn:microsoft.com/office/officeart/2005/8/layout/radial5"/>
-    <dgm:cxn modelId="{D455749F-4F4C-4295-A229-F1CAA9A84B33}" type="presOf" srcId="{C2B16F5E-4FD9-4E6C-984C-5FB34252F788}" destId="{A0AE6ABD-EFF8-41C2-907C-790C07DF522C}" srcOrd="0" destOrd="0" presId="urn:microsoft.com/office/officeart/2005/8/layout/radial5"/>
-    <dgm:cxn modelId="{7EB75183-B20B-4EE8-AF71-83BA84E1BE0D}" type="presOf" srcId="{8F21B166-5620-46A8-A5DD-72EAE361E61D}" destId="{470BEB95-5498-4076-A7AD-52EA2D6058A0}" srcOrd="0" destOrd="0" presId="urn:microsoft.com/office/officeart/2005/8/layout/radial5"/>
-    <dgm:cxn modelId="{33010AF7-9670-4113-8A43-897FBCF42E9F}" type="presOf" srcId="{CFE62A0D-AFCB-42FF-A2F7-4127DE6E4A06}" destId="{8999D690-D432-4F1A-B2AE-D98A61E6F24A}" srcOrd="0" destOrd="0" presId="urn:microsoft.com/office/officeart/2005/8/layout/radial5"/>
-    <dgm:cxn modelId="{F98C9256-0E52-4294-AA5B-17A525F41415}" type="presOf" srcId="{813DB034-1CFA-4CE1-8536-6BC256192226}" destId="{60779230-642B-46DB-B5CA-FC2220C38859}" srcOrd="0" destOrd="0" presId="urn:microsoft.com/office/officeart/2005/8/layout/radial5"/>
-    <dgm:cxn modelId="{F67B8136-3A2B-408C-9570-C50B3786C6D1}" srcId="{D3864EA6-13E7-440F-948B-8118F5878A44}" destId="{9A038BAD-1DAA-4E08-AF5C-7A535C3A31A3}" srcOrd="3" destOrd="0" parTransId="{E1D6882F-7F41-4B9B-8326-079D0B7775D3}" sibTransId="{BF904E21-59DA-42DB-BE7C-359EAF11BFDB}"/>
-    <dgm:cxn modelId="{D74F0E62-DE98-4010-8B2E-1EAAA9E56350}" type="presOf" srcId="{14E5A95F-9DC9-4E33-B709-14C57323ACAA}" destId="{0B5562C5-56E9-4F94-AD9A-09B6AA6E206F}" srcOrd="0" destOrd="0" presId="urn:microsoft.com/office/officeart/2005/8/layout/radial5"/>
     <dgm:cxn modelId="{7A2CDD09-A224-4181-B0A8-F745690C8BD3}" type="presParOf" srcId="{EB09D521-9D02-4B4D-80CB-EB847731A63E}" destId="{7ADCFBEC-172E-41BB-B545-FE2085E0B744}" srcOrd="0" destOrd="0" presId="urn:microsoft.com/office/officeart/2005/8/layout/radial5"/>
     <dgm:cxn modelId="{7BB1E9F2-577C-4EDD-9E82-599DABB04466}" type="presParOf" srcId="{EB09D521-9D02-4B4D-80CB-EB847731A63E}" destId="{E09D1B4B-09AE-4B1F-A409-CE344F8F9185}" srcOrd="1" destOrd="0" presId="urn:microsoft.com/office/officeart/2005/8/layout/radial5"/>
     <dgm:cxn modelId="{E09E266F-8E22-44BE-8978-A502F4303C38}" type="presParOf" srcId="{E09D1B4B-09AE-4B1F-A409-CE344F8F9185}" destId="{79A2186A-8429-4E95-A4D2-214813090081}" srcOrd="0" destOrd="0" presId="urn:microsoft.com/office/officeart/2005/8/layout/radial5"/>
@@ -1412,14 +1408,14 @@
   <dgm:whole/>
   <dgm:extLst>
     <a:ext uri="http://schemas.microsoft.com/office/drawing/2008/diagram">
-      <dsp:dataModelExt xmlns:dsp="http://schemas.microsoft.com/office/drawing/2008/diagram" relId="rId10" minVer="http://schemas.openxmlformats.org/drawingml/2006/diagram"/>
+      <dsp:dataModelExt xmlns:dsp="http://schemas.microsoft.com/office/drawing/2008/diagram" xmlns="" relId="rId10" minVer="http://schemas.openxmlformats.org/drawingml/2006/diagram"/>
     </a:ext>
   </dgm:extLst>
 </dgm:dataModel>
 </file>
 
 <file path=ppt/diagrams/drawing1.xml><?xml version="1.0" encoding="utf-8"?>
-<dsp:drawing xmlns:dgm="http://schemas.openxmlformats.org/drawingml/2006/diagram" xmlns:dsp="http://schemas.microsoft.com/office/drawing/2008/diagram" xmlns:a="http://schemas.openxmlformats.org/drawingml/2006/main">
+<dsp:drawing xmlns:dgm="http://schemas.openxmlformats.org/drawingml/2006/diagram" xmlns:a="http://schemas.openxmlformats.org/drawingml/2006/main" xmlns:dsp="http://schemas.microsoft.com/office/drawing/2008/diagram">
   <dsp:spTree>
     <dsp:nvGrpSpPr>
       <dsp:cNvPr id="0" name=""/>
@@ -1549,8 +1545,8 @@
         </a:p>
       </dsp:txBody>
       <dsp:txXfrm>
-        <a:off x="3582038" y="1903007"/>
-        <a:ext cx="1179822" cy="1179822"/>
+        <a:off x="3337689" y="1658658"/>
+        <a:ext cx="1668520" cy="1668520"/>
       </dsp:txXfrm>
     </dsp:sp>
     <dsp:sp modelId="{E09D1B4B-09AE-4B1F-A409-CE344F8F9185}">
@@ -1672,9 +1668,9 @@
           <a:endParaRPr lang="en-US" sz="1900" kern="1200"/>
         </a:p>
       </dsp:txBody>
-      <dsp:txXfrm rot="10800000">
-        <a:off x="4128026" y="1441059"/>
-        <a:ext cx="76862" cy="267209"/>
+      <dsp:txXfrm rot="16179437">
+        <a:off x="4111457" y="1335520"/>
+        <a:ext cx="109803" cy="445347"/>
       </dsp:txXfrm>
     </dsp:sp>
     <dsp:sp modelId="{60779230-642B-46DB-B5CA-FC2220C38859}">
@@ -1800,8 +1796,8 @@
         </a:p>
       </dsp:txBody>
       <dsp:txXfrm>
-        <a:off x="3616493" y="136686"/>
-        <a:ext cx="1089239" cy="1089239"/>
+        <a:off x="3390904" y="-88903"/>
+        <a:ext cx="1540417" cy="1540417"/>
       </dsp:txXfrm>
     </dsp:sp>
     <dsp:sp modelId="{4873F644-A37B-4263-BDD3-7D4AECF93436}">
@@ -1923,9 +1919,9 @@
           <a:endParaRPr lang="en-US" sz="1900" kern="1200"/>
         </a:p>
       </dsp:txBody>
-      <dsp:txXfrm>
-        <a:off x="5006797" y="2072128"/>
-        <a:ext cx="78509" cy="267209"/>
+      <dsp:txXfrm rot="20508725">
+        <a:off x="5005956" y="1977808"/>
+        <a:ext cx="112156" cy="445347"/>
       </dsp:txXfrm>
     </dsp:sp>
     <dsp:sp modelId="{8FE55D76-69B8-469D-BE4A-A0F9F69D5110}">
@@ -2049,18 +2045,14 @@
           </a:r>
           <a:r>
             <a:rPr lang="en-US" sz="1300" b="1" kern="1200" spc="-10" baseline="0" dirty="0" smtClean="0"/>
-            <a:t> </a:t>
-          </a:r>
-          <a:r>
-            <a:rPr lang="en-US" sz="1300" b="1" kern="1200" spc="-10" baseline="0" dirty="0" smtClean="0"/>
-            <a:t>Client and Gestures</a:t>
+            <a:t> Client and Gestures</a:t>
           </a:r>
           <a:endParaRPr lang="en-US" sz="1300" b="1" kern="1200" spc="-10" baseline="0" dirty="0"/>
         </a:p>
       </dsp:txBody>
       <dsp:txXfrm>
-        <a:off x="5352679" y="1381436"/>
-        <a:ext cx="1089239" cy="1089239"/>
+        <a:off x="5127090" y="1155847"/>
+        <a:ext cx="1540417" cy="1540417"/>
       </dsp:txXfrm>
     </dsp:sp>
     <dsp:sp modelId="{8999D690-D432-4F1A-B2AE-D98A61E6F24A}">
@@ -2182,9 +2174,9 @@
           <a:endParaRPr lang="en-US" sz="1900" kern="1200"/>
         </a:p>
       </dsp:txBody>
-      <dsp:txXfrm>
-        <a:off x="4674466" y="3109672"/>
-        <a:ext cx="85301" cy="267209"/>
+      <dsp:txXfrm rot="3240000">
+        <a:off x="4666931" y="3035391"/>
+        <a:ext cx="121859" cy="445347"/>
       </dsp:txXfrm>
     </dsp:sp>
     <dsp:sp modelId="{0B5562C5-56E9-4F94-AD9A-09B6AA6E206F}">
@@ -2310,8 +2302,8 @@
         </a:p>
       </dsp:txBody>
       <dsp:txXfrm>
-        <a:off x="4705558" y="3432353"/>
-        <a:ext cx="1089239" cy="1089239"/>
+        <a:off x="4479969" y="3206764"/>
+        <a:ext cx="1540417" cy="1540417"/>
       </dsp:txXfrm>
     </dsp:sp>
     <dsp:sp modelId="{FB0FDE60-5A66-47CD-855C-10B0ABFAFF6D}">
@@ -2433,9 +2425,9 @@
           <a:endParaRPr lang="en-US" sz="1900" kern="1200"/>
         </a:p>
       </dsp:txBody>
-      <dsp:txXfrm rot="10800000">
-        <a:off x="3584132" y="3109672"/>
-        <a:ext cx="85301" cy="267209"/>
+      <dsp:txXfrm rot="7560000">
+        <a:off x="3555109" y="3035391"/>
+        <a:ext cx="121859" cy="445347"/>
       </dsp:txXfrm>
     </dsp:sp>
     <dsp:sp modelId="{492A8904-4F29-41B2-8DF6-9E5DB43B598E}">
@@ -2561,8 +2553,8 @@
         </a:p>
       </dsp:txBody>
       <dsp:txXfrm>
-        <a:off x="2549101" y="3432353"/>
-        <a:ext cx="1089239" cy="1089239"/>
+        <a:off x="2323512" y="3206764"/>
+        <a:ext cx="1540417" cy="1540417"/>
       </dsp:txXfrm>
     </dsp:sp>
     <dsp:sp modelId="{470BEB95-5498-4076-A7AD-52EA2D6058A0}">
@@ -2684,9 +2676,9 @@
           <a:endParaRPr lang="en-US" sz="1900" kern="1200"/>
         </a:p>
       </dsp:txBody>
-      <dsp:txXfrm rot="10800000">
-        <a:off x="3247199" y="2072703"/>
-        <a:ext cx="85301" cy="267209"/>
+      <dsp:txXfrm rot="11880000">
+        <a:off x="3211536" y="1977985"/>
+        <a:ext cx="121859" cy="445347"/>
       </dsp:txXfrm>
     </dsp:sp>
     <dsp:sp modelId="{A0AE6ABD-EFF8-41C2-907C-790C07DF522C}">
@@ -2829,8 +2821,8 @@
         </a:p>
       </dsp:txBody>
       <dsp:txXfrm>
-        <a:off x="1882719" y="1381440"/>
-        <a:ext cx="1089239" cy="1089239"/>
+        <a:off x="1657130" y="1155851"/>
+        <a:ext cx="1540417" cy="1540417"/>
       </dsp:txXfrm>
     </dsp:sp>
   </dsp:spTree>
@@ -4219,7 +4211,7 @@
             <a:fld id="{724506C0-3FFE-45A5-803D-9F4FC5464A70}" type="datetimeFigureOut">
               <a:rPr lang="en-US" smtClean="0"/>
               <a:pPr/>
-              <a:t>10/23/2011</a:t>
+              <a:t>10/24/2011</a:t>
             </a:fld>
             <a:endParaRPr lang="en-US"/>
           </a:p>
@@ -4388,7 +4380,7 @@
     </p:spTree>
     <p:extLst>
       <p:ext uri="{BB962C8B-B14F-4D97-AF65-F5344CB8AC3E}">
-        <p14:creationId xmlns:p14="http://schemas.microsoft.com/office/powerpoint/2010/main" val="650118158"/>
+        <p14:creationId xmlns:p14="http://schemas.microsoft.com/office/powerpoint/2010/main" xmlns="" val="650118158"/>
       </p:ext>
     </p:extLst>
   </p:cSld>
@@ -5240,7 +5232,7 @@
             <a:fld id="{F922158D-428B-4987-8B28-745A2AFA1252}" type="datetimeFigureOut">
               <a:rPr lang="en-US" smtClean="0"/>
               <a:pPr/>
-              <a:t>10/23/2011</a:t>
+              <a:t>10/24/2011</a:t>
             </a:fld>
             <a:endParaRPr lang="en-US"/>
           </a:p>
@@ -5301,7 +5293,7 @@
           <a:blip r:embed="rId2" cstate="email">
             <a:extLst>
               <a:ext uri="{28A0092B-C50C-407E-A947-70E740481C1C}">
-                <a14:useLocalDpi xmlns:a14="http://schemas.microsoft.com/office/drawing/2010/main"/>
+                <a14:useLocalDpi xmlns:a14="http://schemas.microsoft.com/office/drawing/2010/main" xmlns=""/>
               </a:ext>
             </a:extLst>
           </a:blip>
@@ -5331,7 +5323,7 @@
           <a:blip r:embed="rId3" cstate="email">
             <a:extLst>
               <a:ext uri="{28A0092B-C50C-407E-A947-70E740481C1C}">
-                <a14:useLocalDpi xmlns:a14="http://schemas.microsoft.com/office/drawing/2010/main"/>
+                <a14:useLocalDpi xmlns:a14="http://schemas.microsoft.com/office/drawing/2010/main" xmlns=""/>
               </a:ext>
             </a:extLst>
           </a:blip>
@@ -5370,7 +5362,7 @@
           <a:blip r:embed="rId4" cstate="email">
             <a:extLst>
               <a:ext uri="{28A0092B-C50C-407E-A947-70E740481C1C}">
-                <a14:useLocalDpi xmlns:a14="http://schemas.microsoft.com/office/drawing/2010/main"/>
+                <a14:useLocalDpi xmlns:a14="http://schemas.microsoft.com/office/drawing/2010/main" xmlns=""/>
               </a:ext>
             </a:extLst>
           </a:blip>
@@ -5409,7 +5401,7 @@
           <a:blip r:embed="rId5" cstate="email">
             <a:extLst>
               <a:ext uri="{28A0092B-C50C-407E-A947-70E740481C1C}">
-                <a14:useLocalDpi xmlns:a14="http://schemas.microsoft.com/office/drawing/2010/main"/>
+                <a14:useLocalDpi xmlns:a14="http://schemas.microsoft.com/office/drawing/2010/main" xmlns=""/>
               </a:ext>
             </a:extLst>
           </a:blip>
@@ -5970,7 +5962,7 @@
             <a:fld id="{F922158D-428B-4987-8B28-745A2AFA1252}" type="datetimeFigureOut">
               <a:rPr lang="en-US" smtClean="0"/>
               <a:pPr/>
-              <a:t>10/23/2011</a:t>
+              <a:t>10/24/2011</a:t>
             </a:fld>
             <a:endParaRPr lang="en-US"/>
           </a:p>
@@ -6157,7 +6149,7 @@
             <a:fld id="{F922158D-428B-4987-8B28-745A2AFA1252}" type="datetimeFigureOut">
               <a:rPr lang="en-US" smtClean="0"/>
               <a:pPr/>
-              <a:t>10/23/2011</a:t>
+              <a:t>10/24/2011</a:t>
             </a:fld>
             <a:endParaRPr lang="en-US"/>
           </a:p>
@@ -6334,7 +6326,7 @@
             <a:fld id="{F922158D-428B-4987-8B28-745A2AFA1252}" type="datetimeFigureOut">
               <a:rPr lang="en-US" smtClean="0"/>
               <a:pPr/>
-              <a:t>10/23/2011</a:t>
+              <a:t>10/24/2011</a:t>
             </a:fld>
             <a:endParaRPr lang="en-US"/>
           </a:p>
@@ -6588,7 +6580,7 @@
             <a:fld id="{F922158D-428B-4987-8B28-745A2AFA1252}" type="datetimeFigureOut">
               <a:rPr lang="en-US" smtClean="0"/>
               <a:pPr/>
-              <a:t>10/23/2011</a:t>
+              <a:t>10/24/2011</a:t>
             </a:fld>
             <a:endParaRPr lang="en-US"/>
           </a:p>
@@ -6672,7 +6664,7 @@
           <a:blip r:embed="rId3" cstate="email">
             <a:extLst>
               <a:ext uri="{28A0092B-C50C-407E-A947-70E740481C1C}">
-                <a14:useLocalDpi xmlns:a14="http://schemas.microsoft.com/office/drawing/2010/main"/>
+                <a14:useLocalDpi xmlns:a14="http://schemas.microsoft.com/office/drawing/2010/main" xmlns=""/>
               </a:ext>
             </a:extLst>
           </a:blip>
@@ -7118,7 +7110,7 @@
             <a:fld id="{F922158D-428B-4987-8B28-745A2AFA1252}" type="datetimeFigureOut">
               <a:rPr lang="en-US" smtClean="0"/>
               <a:pPr/>
-              <a:t>10/23/2011</a:t>
+              <a:t>10/24/2011</a:t>
             </a:fld>
             <a:endParaRPr lang="en-US"/>
           </a:p>
@@ -7508,7 +7500,7 @@
             <a:fld id="{F922158D-428B-4987-8B28-745A2AFA1252}" type="datetimeFigureOut">
               <a:rPr lang="en-US" smtClean="0"/>
               <a:pPr/>
-              <a:t>10/23/2011</a:t>
+              <a:t>10/24/2011</a:t>
             </a:fld>
             <a:endParaRPr lang="en-US"/>
           </a:p>
@@ -7670,7 +7662,7 @@
             <a:fld id="{F922158D-428B-4987-8B28-745A2AFA1252}" type="datetimeFigureOut">
               <a:rPr lang="en-US" smtClean="0"/>
               <a:pPr/>
-              <a:t>10/23/2011</a:t>
+              <a:t>10/24/2011</a:t>
             </a:fld>
             <a:endParaRPr lang="en-US"/>
           </a:p>
@@ -7772,7 +7764,7 @@
             <a:fld id="{F922158D-428B-4987-8B28-745A2AFA1252}" type="datetimeFigureOut">
               <a:rPr lang="en-US" smtClean="0"/>
               <a:pPr/>
-              <a:t>10/23/2011</a:t>
+              <a:t>10/24/2011</a:t>
             </a:fld>
             <a:endParaRPr lang="en-US"/>
           </a:p>
@@ -8045,7 +8037,7 @@
             <a:fld id="{F922158D-428B-4987-8B28-745A2AFA1252}" type="datetimeFigureOut">
               <a:rPr lang="en-US" smtClean="0"/>
               <a:pPr/>
-              <a:t>10/23/2011</a:t>
+              <a:t>10/24/2011</a:t>
             </a:fld>
             <a:endParaRPr lang="en-US"/>
           </a:p>
@@ -8345,7 +8337,7 @@
             <a:fld id="{F922158D-428B-4987-8B28-745A2AFA1252}" type="datetimeFigureOut">
               <a:rPr lang="en-US" smtClean="0"/>
               <a:pPr/>
-              <a:t>10/23/2011</a:t>
+              <a:t>10/24/2011</a:t>
             </a:fld>
             <a:endParaRPr lang="en-US"/>
           </a:p>
@@ -9128,7 +9120,7 @@
             <a:fld id="{F922158D-428B-4987-8B28-745A2AFA1252}" type="datetimeFigureOut">
               <a:rPr lang="en-US" smtClean="0"/>
               <a:pPr/>
-              <a:t>10/23/2011</a:t>
+              <a:t>10/24/2011</a:t>
             </a:fld>
             <a:endParaRPr lang="en-US"/>
           </a:p>
@@ -9838,13 +9830,8 @@
             <a:pPr algn="ctr"/>
             <a:r>
               <a:rPr lang="en-US" dirty="0" smtClean="0"/>
-              <a:t>Christian </a:t>
-            </a:r>
-            <a:r>
-              <a:rPr lang="en-US" dirty="0" smtClean="0"/>
-              <a:t>William</a:t>
-            </a:r>
-            <a:endParaRPr lang="en-US" dirty="0" smtClean="0"/>
+              <a:t>Christian William</a:t>
+            </a:r>
           </a:p>
           <a:p>
             <a:pPr algn="ctr"/>
@@ -9935,14 +9922,16 @@
         </p:nvSpPr>
         <p:spPr/>
         <p:txBody>
-          <a:bodyPr/>
+          <a:bodyPr>
+            <a:normAutofit/>
+          </a:bodyPr>
           <a:lstStyle/>
           <a:p>
             <a:r>
-              <a:rPr lang="en-US" dirty="0" smtClean="0"/>
+              <a:rPr lang="en-US" sz="6000" b="1" dirty="0" smtClean="0"/>
               <a:t>Problem</a:t>
             </a:r>
-            <a:endParaRPr lang="en-US" dirty="0"/>
+            <a:endParaRPr lang="en-US" sz="6000" b="1" dirty="0"/>
           </a:p>
         </p:txBody>
       </p:sp>
@@ -10014,12 +10003,12 @@
               <a:t>Limitations of the </a:t>
             </a:r>
             <a:r>
-              <a:rPr lang="en-US" dirty="0" err="1" smtClean="0"/>
-              <a:t>SecondLife</a:t>
-            </a:r>
-            <a:r>
               <a:rPr lang="en-US" dirty="0" smtClean="0"/>
-              <a:t> as a game engine driven environment</a:t>
+              <a:t>Second Life </a:t>
+            </a:r>
+            <a:r>
+              <a:rPr lang="en-US" dirty="0" smtClean="0"/>
+              <a:t>as a game engine driven environment</a:t>
             </a:r>
           </a:p>
           <a:p>
@@ -10032,8 +10021,8 @@
               <a:t>Games playing to the strengths of </a:t>
             </a:r>
             <a:r>
-              <a:rPr lang="en-US" dirty="0" err="1" smtClean="0"/>
-              <a:t>SecondLife</a:t>
+              <a:rPr lang="en-US" dirty="0" smtClean="0"/>
+              <a:t>Second Life</a:t>
             </a:r>
             <a:endParaRPr lang="en-US" dirty="0" smtClean="0"/>
           </a:p>
@@ -10048,7 +10037,7 @@
     </p:spTree>
     <p:extLst>
       <p:ext uri="{BB962C8B-B14F-4D97-AF65-F5344CB8AC3E}">
-        <p14:creationId xmlns:p14="http://schemas.microsoft.com/office/powerpoint/2010/main" val="3818610722"/>
+        <p14:creationId xmlns:p14="http://schemas.microsoft.com/office/powerpoint/2010/main" xmlns="" val="3818610722"/>
       </p:ext>
     </p:extLst>
   </p:cSld>
@@ -10091,7 +10080,7 @@
         <p:spPr>
           <a:xfrm>
             <a:off x="457200" y="762000"/>
-            <a:ext cx="4648200" cy="914400"/>
+            <a:ext cx="6096000" cy="914400"/>
           </a:xfrm>
         </p:spPr>
         <p:txBody>
@@ -10101,14 +10090,10 @@
           <a:lstStyle/>
           <a:p>
             <a:r>
-              <a:rPr lang="en-US" sz="5100" b="1" dirty="0" smtClean="0"/>
-              <a:t>Project </a:t>
-            </a:r>
-            <a:r>
-              <a:rPr lang="en-US" sz="5100" b="1" dirty="0" smtClean="0"/>
-              <a:t>Objective</a:t>
-            </a:r>
-            <a:endParaRPr lang="en-US" sz="5100" b="1" dirty="0"/>
+              <a:rPr lang="en-US" sz="6000" b="1" dirty="0" smtClean="0"/>
+              <a:t>Project Objective</a:t>
+            </a:r>
+            <a:endParaRPr lang="en-US" sz="6000" b="1" dirty="0"/>
           </a:p>
         </p:txBody>
       </p:sp>
@@ -10167,7 +10152,7 @@
           <a:blip r:embed="rId4" cstate="print">
             <a:extLst>
               <a:ext uri="{28A0092B-C50C-407E-A947-70E740481C1C}">
-                <a14:useLocalDpi xmlns:a14="http://schemas.microsoft.com/office/drawing/2010/main" val="0"/>
+                <a14:useLocalDpi xmlns:a14="http://schemas.microsoft.com/office/drawing/2010/main" xmlns="" val="0"/>
               </a:ext>
             </a:extLst>
           </a:blip>
@@ -10187,7 +10172,7 @@
           <a:noFill/>
           <a:extLst>
             <a:ext uri="{909E8E84-426E-40DD-AFC4-6F175D3DCCD1}">
-              <a14:hiddenFill xmlns:a14="http://schemas.microsoft.com/office/drawing/2010/main">
+              <a14:hiddenFill xmlns:a14="http://schemas.microsoft.com/office/drawing/2010/main" xmlns="">
                 <a:solidFill>
                   <a:srgbClr val="FFFFFF"/>
                 </a:solidFill>
@@ -10208,7 +10193,7 @@
           <a:blip r:embed="rId5" cstate="email">
             <a:extLst>
               <a:ext uri="{28A0092B-C50C-407E-A947-70E740481C1C}">
-                <a14:useLocalDpi xmlns:a14="http://schemas.microsoft.com/office/drawing/2010/main" val="0"/>
+                <a14:useLocalDpi xmlns:a14="http://schemas.microsoft.com/office/drawing/2010/main" xmlns="" val="0"/>
               </a:ext>
             </a:extLst>
           </a:blip>
@@ -10228,7 +10213,7 @@
           <a:noFill/>
           <a:extLst>
             <a:ext uri="{909E8E84-426E-40DD-AFC4-6F175D3DCCD1}">
-              <a14:hiddenFill xmlns:a14="http://schemas.microsoft.com/office/drawing/2010/main">
+              <a14:hiddenFill xmlns:a14="http://schemas.microsoft.com/office/drawing/2010/main" xmlns="">
                 <a:solidFill>
                   <a:srgbClr val="FFFFFF"/>
                 </a:solidFill>
@@ -10290,8 +10275,8 @@
         </p:nvSpPr>
         <p:spPr>
           <a:xfrm>
-            <a:off x="457200" y="381000"/>
-            <a:ext cx="8229600" cy="1143000"/>
+            <a:off x="685800" y="457200"/>
+            <a:ext cx="7696200" cy="1143000"/>
           </a:xfrm>
         </p:spPr>
         <p:txBody>
@@ -10301,10 +10286,10 @@
           <a:lstStyle/>
           <a:p>
             <a:r>
-              <a:rPr lang="en-US" b="1" dirty="0" smtClean="0"/>
+              <a:rPr lang="en-US" sz="6000" b="1" dirty="0" smtClean="0"/>
               <a:t>Approach</a:t>
             </a:r>
-            <a:endParaRPr lang="en-US" b="1" dirty="0"/>
+            <a:endParaRPr lang="en-US" sz="6000" b="1" dirty="0"/>
           </a:p>
         </p:txBody>
       </p:sp>
@@ -10321,7 +10306,7 @@
             </p:custDataLst>
             <p:extLst>
               <p:ext uri="{D42A27DB-BD31-4B8C-83A1-F6EECF244321}">
-                <p14:modId xmlns:p14="http://schemas.microsoft.com/office/powerpoint/2010/main" val="69745022"/>
+                <p14:modId xmlns:p14="http://schemas.microsoft.com/office/powerpoint/2010/main" xmlns="" val="69745022"/>
               </p:ext>
             </p:extLst>
           </p:nvPr>
@@ -10550,7 +10535,6 @@
           </a:bodyPr>
           <a:lstStyle/>
           <a:p>
-            <a:pPr algn="ctr"/>
             <a:r>
               <a:rPr lang="en-US" sz="6000" b="1" dirty="0" smtClean="0"/>
               <a:t>Current Status</a:t>
@@ -10606,8 +10590,8 @@
               <a:t>Communication between Kinect and </a:t>
             </a:r>
             <a:r>
-              <a:rPr lang="en-US" dirty="0" err="1" smtClean="0"/>
-              <a:t>SecondLife</a:t>
+              <a:rPr lang="en-US" dirty="0" smtClean="0"/>
+              <a:t>Second Life</a:t>
             </a:r>
             <a:endParaRPr lang="en-US" dirty="0"/>
           </a:p>
@@ -10619,15 +10603,11 @@
             </a:pPr>
             <a:r>
               <a:rPr lang="en-US" dirty="0" smtClean="0"/>
-              <a:t>Rudimentary gesture events </a:t>
+              <a:t>Rudimentary gesture events written with corresponding actions in </a:t>
             </a:r>
             <a:r>
               <a:rPr lang="en-US" dirty="0" smtClean="0"/>
-              <a:t>written with corresponding actions in </a:t>
-            </a:r>
-            <a:r>
-              <a:rPr lang="en-US" dirty="0" err="1" smtClean="0"/>
-              <a:t>SecondLife</a:t>
+              <a:t>Second Life</a:t>
             </a:r>
             <a:endParaRPr lang="en-US" dirty="0"/>
           </a:p>
@@ -10651,11 +10631,7 @@
             </a:pPr>
             <a:r>
               <a:rPr lang="en-US" dirty="0" smtClean="0"/>
-              <a:t>Need to develop the game </a:t>
-            </a:r>
-            <a:r>
-              <a:rPr lang="en-US" dirty="0" smtClean="0"/>
-              <a:t>engine</a:t>
+              <a:t>Need to develop the game engine</a:t>
             </a:r>
           </a:p>
           <a:p>
@@ -10741,7 +10717,6 @@
           </a:bodyPr>
           <a:lstStyle/>
           <a:p>
-            <a:pPr algn="ctr"/>
             <a:r>
               <a:rPr lang="en-US" sz="6000" b="1" dirty="0" smtClean="0"/>
               <a:t>Assignments</a:t>
@@ -10805,7 +10780,6 @@
               <a:rPr lang="en-US" dirty="0" smtClean="0"/>
               <a:t>. </a:t>
             </a:r>
-            <a:endParaRPr lang="en-US" dirty="0" smtClean="0"/>
           </a:p>
           <a:p>
             <a:pPr>
@@ -10896,7 +10870,7 @@
           <a:blip r:embed="rId5" cstate="print">
             <a:extLst>
               <a:ext uri="{28A0092B-C50C-407E-A947-70E740481C1C}">
-                <a14:useLocalDpi xmlns:a14="http://schemas.microsoft.com/office/drawing/2010/main" val="0"/>
+                <a14:useLocalDpi xmlns:a14="http://schemas.microsoft.com/office/drawing/2010/main" xmlns="" val="0"/>
               </a:ext>
             </a:extLst>
           </a:blip>
@@ -10916,7 +10890,7 @@
           <a:noFill/>
           <a:extLst>
             <a:ext uri="{909E8E84-426E-40DD-AFC4-6F175D3DCCD1}">
-              <a14:hiddenFill xmlns:a14="http://schemas.microsoft.com/office/drawing/2010/main">
+              <a14:hiddenFill xmlns:a14="http://schemas.microsoft.com/office/drawing/2010/main" xmlns="">
                 <a:solidFill>
                   <a:srgbClr val="FFFFFF"/>
                 </a:solidFill>
@@ -10997,7 +10971,7 @@
     </p:spTree>
     <p:extLst>
       <p:ext uri="{BB962C8B-B14F-4D97-AF65-F5344CB8AC3E}">
-        <p14:creationId xmlns:p14="http://schemas.microsoft.com/office/powerpoint/2010/main" val="1933149179"/>
+        <p14:creationId xmlns:p14="http://schemas.microsoft.com/office/powerpoint/2010/main" xmlns="" val="1933149179"/>
       </p:ext>
     </p:extLst>
   </p:cSld>

</xml_diff>

<commit_message>
Add the slide for my part of the powerpoint. Game implementation
</commit_message>
<xml_diff>
--- a/ kinect-virtual-world --username c.c.williams55@gmail.com/Report 1 Files/Angry Prims Preliminary Proposal.pptx
+++ b/ kinect-virtual-world --username c.c.williams55@gmail.com/Report 1 Files/Angry Prims Preliminary Proposal.pptx
@@ -5,16 +5,19 @@
     <p:sldMasterId id="2147483948" r:id="rId1"/>
   </p:sldMasterIdLst>
   <p:notesMasterIdLst>
-    <p:notesMasterId r:id="rId9"/>
+    <p:notesMasterId r:id="rId12"/>
   </p:notesMasterIdLst>
   <p:sldIdLst>
     <p:sldId id="259" r:id="rId2"/>
     <p:sldId id="270" r:id="rId3"/>
     <p:sldId id="261" r:id="rId4"/>
     <p:sldId id="268" r:id="rId5"/>
-    <p:sldId id="262" r:id="rId6"/>
-    <p:sldId id="267" r:id="rId7"/>
-    <p:sldId id="269" r:id="rId8"/>
+    <p:sldId id="267" r:id="rId6"/>
+    <p:sldId id="271" r:id="rId7"/>
+    <p:sldId id="272" r:id="rId8"/>
+    <p:sldId id="274" r:id="rId9"/>
+    <p:sldId id="273" r:id="rId10"/>
+    <p:sldId id="269" r:id="rId11"/>
   </p:sldIdLst>
   <p:sldSz cx="9144000" cy="6858000" type="screen4x3"/>
   <p:notesSz cx="6858000" cy="9144000"/>
@@ -115,7 +118,7 @@
   </p:defaultTextStyle>
   <p:extLst>
     <p:ext uri="{521415D9-36F7-43E2-AB2F-B90AF26B5E84}">
-      <p14:sectionLst xmlns:p14="http://schemas.microsoft.com/office/powerpoint/2010/main">
+      <p14:sectionLst xmlns:p14="http://schemas.microsoft.com/office/powerpoint/2010/main" xmlns="">
         <p14:section name="Default Section" id="{992832F5-EA01-48E5-B403-87E193F50680}">
           <p14:sldIdLst>
             <p14:sldId id="259"/>
@@ -1364,29 +1367,29 @@
     </dgm:pt>
   </dgm:ptLst>
   <dgm:cxnLst>
+    <dgm:cxn modelId="{54B2FED9-9F5A-482C-B7AD-CE780DBB4D7A}" type="presOf" srcId="{ED3CCD02-8D75-4A08-AD85-C5F828B29313}" destId="{E09D1B4B-09AE-4B1F-A409-CE344F8F9185}" srcOrd="0" destOrd="0" presId="urn:microsoft.com/office/officeart/2005/8/layout/radial5"/>
+    <dgm:cxn modelId="{DF0DC324-3E24-4C19-A1FD-DD9570009774}" type="presOf" srcId="{9A038BAD-1DAA-4E08-AF5C-7A535C3A31A3}" destId="{492A8904-4F29-41B2-8DF6-9E5DB43B598E}" srcOrd="0" destOrd="0" presId="urn:microsoft.com/office/officeart/2005/8/layout/radial5"/>
+    <dgm:cxn modelId="{7362BBE9-CE05-48ED-9B0F-19744BB7FA24}" type="presOf" srcId="{CFE62A0D-AFCB-42FF-A2F7-4127DE6E4A06}" destId="{5E3992B2-2FF9-4710-BC5D-D3CABAC0944B}" srcOrd="1" destOrd="0" presId="urn:microsoft.com/office/officeart/2005/8/layout/radial5"/>
+    <dgm:cxn modelId="{D455749F-4F4C-4295-A229-F1CAA9A84B33}" type="presOf" srcId="{C2B16F5E-4FD9-4E6C-984C-5FB34252F788}" destId="{A0AE6ABD-EFF8-41C2-907C-790C07DF522C}" srcOrd="0" destOrd="0" presId="urn:microsoft.com/office/officeart/2005/8/layout/radial5"/>
+    <dgm:cxn modelId="{26D1578F-8BE0-4DFF-B5B7-36D919C7DF48}" type="presOf" srcId="{19675BB5-4BE3-4E06-B2B3-AAA3D107C1A8}" destId="{EB09D521-9D02-4B4D-80CB-EB847731A63E}" srcOrd="0" destOrd="0" presId="urn:microsoft.com/office/officeart/2005/8/layout/radial5"/>
+    <dgm:cxn modelId="{29FA02FA-E640-4261-806B-AA21CEF811C3}" type="presOf" srcId="{E1D6882F-7F41-4B9B-8326-079D0B7775D3}" destId="{FB0FDE60-5A66-47CD-855C-10B0ABFAFF6D}" srcOrd="0" destOrd="0" presId="urn:microsoft.com/office/officeart/2005/8/layout/radial5"/>
+    <dgm:cxn modelId="{F98C9256-0E52-4294-AA5B-17A525F41415}" type="presOf" srcId="{813DB034-1CFA-4CE1-8536-6BC256192226}" destId="{60779230-642B-46DB-B5CA-FC2220C38859}" srcOrd="0" destOrd="0" presId="urn:microsoft.com/office/officeart/2005/8/layout/radial5"/>
+    <dgm:cxn modelId="{41966F54-3C25-450E-8104-04B2B9165959}" srcId="{D3864EA6-13E7-440F-948B-8118F5878A44}" destId="{813DB034-1CFA-4CE1-8536-6BC256192226}" srcOrd="0" destOrd="0" parTransId="{ED3CCD02-8D75-4A08-AD85-C5F828B29313}" sibTransId="{F3516F2D-4619-4753-A81E-130803DFBFC7}"/>
+    <dgm:cxn modelId="{7598B8A9-9332-4A2B-B5D9-CF010EBBDF46}" type="presOf" srcId="{8F21B166-5620-46A8-A5DD-72EAE361E61D}" destId="{8C992717-B056-4E89-850B-547F00D86B47}" srcOrd="1" destOrd="0" presId="urn:microsoft.com/office/officeart/2005/8/layout/radial5"/>
+    <dgm:cxn modelId="{D74F0E62-DE98-4010-8B2E-1EAAA9E56350}" type="presOf" srcId="{14E5A95F-9DC9-4E33-B709-14C57323ACAA}" destId="{0B5562C5-56E9-4F94-AD9A-09B6AA6E206F}" srcOrd="0" destOrd="0" presId="urn:microsoft.com/office/officeart/2005/8/layout/radial5"/>
     <dgm:cxn modelId="{5EBF790F-CC7C-4BBA-98A7-614FB5283795}" srcId="{D3864EA6-13E7-440F-948B-8118F5878A44}" destId="{6461E40C-FAF1-4C11-9CA4-01B7756558A8}" srcOrd="1" destOrd="0" parTransId="{5418FCE5-0AC2-479F-8F47-D35F7A60BD8D}" sibTransId="{3D67A8BA-4FB2-401F-A3C1-92132B645061}"/>
+    <dgm:cxn modelId="{7834DFDC-DD97-4D0F-B547-27AB53428B4B}" srcId="{19675BB5-4BE3-4E06-B2B3-AAA3D107C1A8}" destId="{D3864EA6-13E7-440F-948B-8118F5878A44}" srcOrd="0" destOrd="0" parTransId="{5F920266-1B6A-4D7D-8C8B-D20E2934BF67}" sibTransId="{F4FE127A-F33D-4F59-961D-A505D5A781EE}"/>
+    <dgm:cxn modelId="{7EB75183-B20B-4EE8-AF71-83BA84E1BE0D}" type="presOf" srcId="{8F21B166-5620-46A8-A5DD-72EAE361E61D}" destId="{470BEB95-5498-4076-A7AD-52EA2D6058A0}" srcOrd="0" destOrd="0" presId="urn:microsoft.com/office/officeart/2005/8/layout/radial5"/>
     <dgm:cxn modelId="{F383A1C8-295E-4F6E-9C5D-67AA4DB4F7EB}" type="presOf" srcId="{ED3CCD02-8D75-4A08-AD85-C5F828B29313}" destId="{79A2186A-8429-4E95-A4D2-214813090081}" srcOrd="1" destOrd="0" presId="urn:microsoft.com/office/officeart/2005/8/layout/radial5"/>
-    <dgm:cxn modelId="{54B2FED9-9F5A-482C-B7AD-CE780DBB4D7A}" type="presOf" srcId="{ED3CCD02-8D75-4A08-AD85-C5F828B29313}" destId="{E09D1B4B-09AE-4B1F-A409-CE344F8F9185}" srcOrd="0" destOrd="0" presId="urn:microsoft.com/office/officeart/2005/8/layout/radial5"/>
-    <dgm:cxn modelId="{7834DFDC-DD97-4D0F-B547-27AB53428B4B}" srcId="{19675BB5-4BE3-4E06-B2B3-AAA3D107C1A8}" destId="{D3864EA6-13E7-440F-948B-8118F5878A44}" srcOrd="0" destOrd="0" parTransId="{5F920266-1B6A-4D7D-8C8B-D20E2934BF67}" sibTransId="{F4FE127A-F33D-4F59-961D-A505D5A781EE}"/>
+    <dgm:cxn modelId="{4D341991-5DB3-4739-89C1-0B6A24A114E8}" type="presOf" srcId="{5418FCE5-0AC2-479F-8F47-D35F7A60BD8D}" destId="{4873F644-A37B-4263-BDD3-7D4AECF93436}" srcOrd="0" destOrd="0" presId="urn:microsoft.com/office/officeart/2005/8/layout/radial5"/>
+    <dgm:cxn modelId="{67029EA3-AC4E-48C5-87CF-57A4733799CA}" type="presOf" srcId="{E1D6882F-7F41-4B9B-8326-079D0B7775D3}" destId="{D9C29361-9907-4AA5-9D4C-465D8E4516DA}" srcOrd="1" destOrd="0" presId="urn:microsoft.com/office/officeart/2005/8/layout/radial5"/>
+    <dgm:cxn modelId="{B78770BC-227B-404F-8185-2F70ECA32605}" srcId="{D3864EA6-13E7-440F-948B-8118F5878A44}" destId="{14E5A95F-9DC9-4E33-B709-14C57323ACAA}" srcOrd="2" destOrd="0" parTransId="{CFE62A0D-AFCB-42FF-A2F7-4127DE6E4A06}" sibTransId="{87455A86-154D-4572-BF6D-F5FEBED08194}"/>
     <dgm:cxn modelId="{33CA9426-6028-4F9E-ADDB-AA3042A81F7D}" type="presOf" srcId="{6461E40C-FAF1-4C11-9CA4-01B7756558A8}" destId="{8FE55D76-69B8-469D-BE4A-A0F9F69D5110}" srcOrd="0" destOrd="0" presId="urn:microsoft.com/office/officeart/2005/8/layout/radial5"/>
-    <dgm:cxn modelId="{29FA02FA-E640-4261-806B-AA21CEF811C3}" type="presOf" srcId="{E1D6882F-7F41-4B9B-8326-079D0B7775D3}" destId="{FB0FDE60-5A66-47CD-855C-10B0ABFAFF6D}" srcOrd="0" destOrd="0" presId="urn:microsoft.com/office/officeart/2005/8/layout/radial5"/>
+    <dgm:cxn modelId="{459BE59C-8527-4040-AA6D-E00460E9E8BD}" type="presOf" srcId="{D3864EA6-13E7-440F-948B-8118F5878A44}" destId="{7ADCFBEC-172E-41BB-B545-FE2085E0B744}" srcOrd="0" destOrd="0" presId="urn:microsoft.com/office/officeart/2005/8/layout/radial5"/>
+    <dgm:cxn modelId="{F20E6E35-2EF6-49E1-BCE2-AF737813AC7F}" srcId="{D3864EA6-13E7-440F-948B-8118F5878A44}" destId="{C2B16F5E-4FD9-4E6C-984C-5FB34252F788}" srcOrd="4" destOrd="0" parTransId="{8F21B166-5620-46A8-A5DD-72EAE361E61D}" sibTransId="{D972BA52-9B06-4D48-9819-200C1326EA4D}"/>
+    <dgm:cxn modelId="{F67B8136-3A2B-408C-9570-C50B3786C6D1}" srcId="{D3864EA6-13E7-440F-948B-8118F5878A44}" destId="{9A038BAD-1DAA-4E08-AF5C-7A535C3A31A3}" srcOrd="3" destOrd="0" parTransId="{E1D6882F-7F41-4B9B-8326-079D0B7775D3}" sibTransId="{BF904E21-59DA-42DB-BE7C-359EAF11BFDB}"/>
+    <dgm:cxn modelId="{33010AF7-9670-4113-8A43-897FBCF42E9F}" type="presOf" srcId="{CFE62A0D-AFCB-42FF-A2F7-4127DE6E4A06}" destId="{8999D690-D432-4F1A-B2AE-D98A61E6F24A}" srcOrd="0" destOrd="0" presId="urn:microsoft.com/office/officeart/2005/8/layout/radial5"/>
     <dgm:cxn modelId="{9D61B47E-7F41-4639-962A-9097B26F323C}" type="presOf" srcId="{5418FCE5-0AC2-479F-8F47-D35F7A60BD8D}" destId="{AF2E0478-D773-4966-9A95-8E70AD7139B7}" srcOrd="1" destOrd="0" presId="urn:microsoft.com/office/officeart/2005/8/layout/radial5"/>
-    <dgm:cxn modelId="{F20E6E35-2EF6-49E1-BCE2-AF737813AC7F}" srcId="{D3864EA6-13E7-440F-948B-8118F5878A44}" destId="{C2B16F5E-4FD9-4E6C-984C-5FB34252F788}" srcOrd="4" destOrd="0" parTransId="{8F21B166-5620-46A8-A5DD-72EAE361E61D}" sibTransId="{D972BA52-9B06-4D48-9819-200C1326EA4D}"/>
-    <dgm:cxn modelId="{7362BBE9-CE05-48ED-9B0F-19744BB7FA24}" type="presOf" srcId="{CFE62A0D-AFCB-42FF-A2F7-4127DE6E4A06}" destId="{5E3992B2-2FF9-4710-BC5D-D3CABAC0944B}" srcOrd="1" destOrd="0" presId="urn:microsoft.com/office/officeart/2005/8/layout/radial5"/>
-    <dgm:cxn modelId="{67029EA3-AC4E-48C5-87CF-57A4733799CA}" type="presOf" srcId="{E1D6882F-7F41-4B9B-8326-079D0B7775D3}" destId="{D9C29361-9907-4AA5-9D4C-465D8E4516DA}" srcOrd="1" destOrd="0" presId="urn:microsoft.com/office/officeart/2005/8/layout/radial5"/>
-    <dgm:cxn modelId="{DF0DC324-3E24-4C19-A1FD-DD9570009774}" type="presOf" srcId="{9A038BAD-1DAA-4E08-AF5C-7A535C3A31A3}" destId="{492A8904-4F29-41B2-8DF6-9E5DB43B598E}" srcOrd="0" destOrd="0" presId="urn:microsoft.com/office/officeart/2005/8/layout/radial5"/>
-    <dgm:cxn modelId="{459BE59C-8527-4040-AA6D-E00460E9E8BD}" type="presOf" srcId="{D3864EA6-13E7-440F-948B-8118F5878A44}" destId="{7ADCFBEC-172E-41BB-B545-FE2085E0B744}" srcOrd="0" destOrd="0" presId="urn:microsoft.com/office/officeart/2005/8/layout/radial5"/>
-    <dgm:cxn modelId="{26D1578F-8BE0-4DFF-B5B7-36D919C7DF48}" type="presOf" srcId="{19675BB5-4BE3-4E06-B2B3-AAA3D107C1A8}" destId="{EB09D521-9D02-4B4D-80CB-EB847731A63E}" srcOrd="0" destOrd="0" presId="urn:microsoft.com/office/officeart/2005/8/layout/radial5"/>
-    <dgm:cxn modelId="{41966F54-3C25-450E-8104-04B2B9165959}" srcId="{D3864EA6-13E7-440F-948B-8118F5878A44}" destId="{813DB034-1CFA-4CE1-8536-6BC256192226}" srcOrd="0" destOrd="0" parTransId="{ED3CCD02-8D75-4A08-AD85-C5F828B29313}" sibTransId="{F3516F2D-4619-4753-A81E-130803DFBFC7}"/>
-    <dgm:cxn modelId="{B78770BC-227B-404F-8185-2F70ECA32605}" srcId="{D3864EA6-13E7-440F-948B-8118F5878A44}" destId="{14E5A95F-9DC9-4E33-B709-14C57323ACAA}" srcOrd="2" destOrd="0" parTransId="{CFE62A0D-AFCB-42FF-A2F7-4127DE6E4A06}" sibTransId="{87455A86-154D-4572-BF6D-F5FEBED08194}"/>
-    <dgm:cxn modelId="{4D341991-5DB3-4739-89C1-0B6A24A114E8}" type="presOf" srcId="{5418FCE5-0AC2-479F-8F47-D35F7A60BD8D}" destId="{4873F644-A37B-4263-BDD3-7D4AECF93436}" srcOrd="0" destOrd="0" presId="urn:microsoft.com/office/officeart/2005/8/layout/radial5"/>
-    <dgm:cxn modelId="{7598B8A9-9332-4A2B-B5D9-CF010EBBDF46}" type="presOf" srcId="{8F21B166-5620-46A8-A5DD-72EAE361E61D}" destId="{8C992717-B056-4E89-850B-547F00D86B47}" srcOrd="1" destOrd="0" presId="urn:microsoft.com/office/officeart/2005/8/layout/radial5"/>
-    <dgm:cxn modelId="{D455749F-4F4C-4295-A229-F1CAA9A84B33}" type="presOf" srcId="{C2B16F5E-4FD9-4E6C-984C-5FB34252F788}" destId="{A0AE6ABD-EFF8-41C2-907C-790C07DF522C}" srcOrd="0" destOrd="0" presId="urn:microsoft.com/office/officeart/2005/8/layout/radial5"/>
-    <dgm:cxn modelId="{7EB75183-B20B-4EE8-AF71-83BA84E1BE0D}" type="presOf" srcId="{8F21B166-5620-46A8-A5DD-72EAE361E61D}" destId="{470BEB95-5498-4076-A7AD-52EA2D6058A0}" srcOrd="0" destOrd="0" presId="urn:microsoft.com/office/officeart/2005/8/layout/radial5"/>
-    <dgm:cxn modelId="{33010AF7-9670-4113-8A43-897FBCF42E9F}" type="presOf" srcId="{CFE62A0D-AFCB-42FF-A2F7-4127DE6E4A06}" destId="{8999D690-D432-4F1A-B2AE-D98A61E6F24A}" srcOrd="0" destOrd="0" presId="urn:microsoft.com/office/officeart/2005/8/layout/radial5"/>
-    <dgm:cxn modelId="{F98C9256-0E52-4294-AA5B-17A525F41415}" type="presOf" srcId="{813DB034-1CFA-4CE1-8536-6BC256192226}" destId="{60779230-642B-46DB-B5CA-FC2220C38859}" srcOrd="0" destOrd="0" presId="urn:microsoft.com/office/officeart/2005/8/layout/radial5"/>
-    <dgm:cxn modelId="{F67B8136-3A2B-408C-9570-C50B3786C6D1}" srcId="{D3864EA6-13E7-440F-948B-8118F5878A44}" destId="{9A038BAD-1DAA-4E08-AF5C-7A535C3A31A3}" srcOrd="3" destOrd="0" parTransId="{E1D6882F-7F41-4B9B-8326-079D0B7775D3}" sibTransId="{BF904E21-59DA-42DB-BE7C-359EAF11BFDB}"/>
-    <dgm:cxn modelId="{D74F0E62-DE98-4010-8B2E-1EAAA9E56350}" type="presOf" srcId="{14E5A95F-9DC9-4E33-B709-14C57323ACAA}" destId="{0B5562C5-56E9-4F94-AD9A-09B6AA6E206F}" srcOrd="0" destOrd="0" presId="urn:microsoft.com/office/officeart/2005/8/layout/radial5"/>
     <dgm:cxn modelId="{7A2CDD09-A224-4181-B0A8-F745690C8BD3}" type="presParOf" srcId="{EB09D521-9D02-4B4D-80CB-EB847731A63E}" destId="{7ADCFBEC-172E-41BB-B545-FE2085E0B744}" srcOrd="0" destOrd="0" presId="urn:microsoft.com/office/officeart/2005/8/layout/radial5"/>
     <dgm:cxn modelId="{7BB1E9F2-577C-4EDD-9E82-599DABB04466}" type="presParOf" srcId="{EB09D521-9D02-4B4D-80CB-EB847731A63E}" destId="{E09D1B4B-09AE-4B1F-A409-CE344F8F9185}" srcOrd="1" destOrd="0" presId="urn:microsoft.com/office/officeart/2005/8/layout/radial5"/>
     <dgm:cxn modelId="{E09E266F-8E22-44BE-8978-A502F4303C38}" type="presParOf" srcId="{E09D1B4B-09AE-4B1F-A409-CE344F8F9185}" destId="{79A2186A-8429-4E95-A4D2-214813090081}" srcOrd="0" destOrd="0" presId="urn:microsoft.com/office/officeart/2005/8/layout/radial5"/>
@@ -1408,14 +1411,14 @@
   <dgm:whole/>
   <dgm:extLst>
     <a:ext uri="http://schemas.microsoft.com/office/drawing/2008/diagram">
-      <dsp:dataModelExt xmlns:dsp="http://schemas.microsoft.com/office/drawing/2008/diagram" relId="rId10" minVer="http://schemas.openxmlformats.org/drawingml/2006/diagram"/>
+      <dsp:dataModelExt xmlns:dsp="http://schemas.microsoft.com/office/drawing/2008/diagram" xmlns="" relId="rId10" minVer="http://schemas.openxmlformats.org/drawingml/2006/diagram"/>
     </a:ext>
   </dgm:extLst>
 </dgm:dataModel>
 </file>
 
 <file path=ppt/diagrams/drawing1.xml><?xml version="1.0" encoding="utf-8"?>
-<dsp:drawing xmlns:dgm="http://schemas.openxmlformats.org/drawingml/2006/diagram" xmlns:dsp="http://schemas.microsoft.com/office/drawing/2008/diagram" xmlns:a="http://schemas.openxmlformats.org/drawingml/2006/main">
+<dsp:drawing xmlns:dgm="http://schemas.openxmlformats.org/drawingml/2006/diagram" xmlns:a="http://schemas.openxmlformats.org/drawingml/2006/main" xmlns:dsp="http://schemas.microsoft.com/office/drawing/2008/diagram">
   <dsp:spTree>
     <dsp:nvGrpSpPr>
       <dsp:cNvPr id="0" name=""/>
@@ -1545,8 +1548,8 @@
         </a:p>
       </dsp:txBody>
       <dsp:txXfrm>
-        <a:off x="3582038" y="1903007"/>
-        <a:ext cx="1179822" cy="1179822"/>
+        <a:off x="3337689" y="1658658"/>
+        <a:ext cx="1668520" cy="1668520"/>
       </dsp:txXfrm>
     </dsp:sp>
     <dsp:sp modelId="{E09D1B4B-09AE-4B1F-A409-CE344F8F9185}">
@@ -1668,9 +1671,9 @@
           <a:endParaRPr lang="en-US" sz="1900" kern="1200"/>
         </a:p>
       </dsp:txBody>
-      <dsp:txXfrm rot="10800000">
-        <a:off x="4128026" y="1441059"/>
-        <a:ext cx="76862" cy="267209"/>
+      <dsp:txXfrm rot="16179437">
+        <a:off x="4111457" y="1335520"/>
+        <a:ext cx="109803" cy="445347"/>
       </dsp:txXfrm>
     </dsp:sp>
     <dsp:sp modelId="{60779230-642B-46DB-B5CA-FC2220C38859}">
@@ -1796,8 +1799,8 @@
         </a:p>
       </dsp:txBody>
       <dsp:txXfrm>
-        <a:off x="3616493" y="136686"/>
-        <a:ext cx="1089239" cy="1089239"/>
+        <a:off x="3390904" y="-88903"/>
+        <a:ext cx="1540417" cy="1540417"/>
       </dsp:txXfrm>
     </dsp:sp>
     <dsp:sp modelId="{4873F644-A37B-4263-BDD3-7D4AECF93436}">
@@ -1919,9 +1922,9 @@
           <a:endParaRPr lang="en-US" sz="1900" kern="1200"/>
         </a:p>
       </dsp:txBody>
-      <dsp:txXfrm>
-        <a:off x="5006797" y="2072128"/>
-        <a:ext cx="78509" cy="267209"/>
+      <dsp:txXfrm rot="20508725">
+        <a:off x="5005956" y="1977808"/>
+        <a:ext cx="112156" cy="445347"/>
       </dsp:txXfrm>
     </dsp:sp>
     <dsp:sp modelId="{8FE55D76-69B8-469D-BE4A-A0F9F69D5110}">
@@ -2051,8 +2054,8 @@
         </a:p>
       </dsp:txBody>
       <dsp:txXfrm>
-        <a:off x="5352679" y="1381436"/>
-        <a:ext cx="1089239" cy="1089239"/>
+        <a:off x="5127090" y="1155847"/>
+        <a:ext cx="1540417" cy="1540417"/>
       </dsp:txXfrm>
     </dsp:sp>
     <dsp:sp modelId="{8999D690-D432-4F1A-B2AE-D98A61E6F24A}">
@@ -2174,9 +2177,9 @@
           <a:endParaRPr lang="en-US" sz="1900" kern="1200"/>
         </a:p>
       </dsp:txBody>
-      <dsp:txXfrm>
-        <a:off x="4674466" y="3109672"/>
-        <a:ext cx="85301" cy="267209"/>
+      <dsp:txXfrm rot="3240000">
+        <a:off x="4666931" y="3035391"/>
+        <a:ext cx="121859" cy="445347"/>
       </dsp:txXfrm>
     </dsp:sp>
     <dsp:sp modelId="{0B5562C5-56E9-4F94-AD9A-09B6AA6E206F}">
@@ -2302,8 +2305,8 @@
         </a:p>
       </dsp:txBody>
       <dsp:txXfrm>
-        <a:off x="4705558" y="3432353"/>
-        <a:ext cx="1089239" cy="1089239"/>
+        <a:off x="4479969" y="3206764"/>
+        <a:ext cx="1540417" cy="1540417"/>
       </dsp:txXfrm>
     </dsp:sp>
     <dsp:sp modelId="{FB0FDE60-5A66-47CD-855C-10B0ABFAFF6D}">
@@ -2425,9 +2428,9 @@
           <a:endParaRPr lang="en-US" sz="1900" kern="1200"/>
         </a:p>
       </dsp:txBody>
-      <dsp:txXfrm rot="10800000">
-        <a:off x="3584132" y="3109672"/>
-        <a:ext cx="85301" cy="267209"/>
+      <dsp:txXfrm rot="7560000">
+        <a:off x="3555109" y="3035391"/>
+        <a:ext cx="121859" cy="445347"/>
       </dsp:txXfrm>
     </dsp:sp>
     <dsp:sp modelId="{492A8904-4F29-41B2-8DF6-9E5DB43B598E}">
@@ -2553,8 +2556,8 @@
         </a:p>
       </dsp:txBody>
       <dsp:txXfrm>
-        <a:off x="2549101" y="3432353"/>
-        <a:ext cx="1089239" cy="1089239"/>
+        <a:off x="2323512" y="3206764"/>
+        <a:ext cx="1540417" cy="1540417"/>
       </dsp:txXfrm>
     </dsp:sp>
     <dsp:sp modelId="{470BEB95-5498-4076-A7AD-52EA2D6058A0}">
@@ -2676,9 +2679,9 @@
           <a:endParaRPr lang="en-US" sz="1900" kern="1200"/>
         </a:p>
       </dsp:txBody>
-      <dsp:txXfrm rot="10800000">
-        <a:off x="3247199" y="2072703"/>
-        <a:ext cx="85301" cy="267209"/>
+      <dsp:txXfrm rot="11880000">
+        <a:off x="3211536" y="1977985"/>
+        <a:ext cx="121859" cy="445347"/>
       </dsp:txXfrm>
     </dsp:sp>
     <dsp:sp modelId="{A0AE6ABD-EFF8-41C2-907C-790C07DF522C}">
@@ -2821,8 +2824,8 @@
         </a:p>
       </dsp:txBody>
       <dsp:txXfrm>
-        <a:off x="1882719" y="1381440"/>
-        <a:ext cx="1089239" cy="1089239"/>
+        <a:off x="1657130" y="1155851"/>
+        <a:ext cx="1540417" cy="1540417"/>
       </dsp:txXfrm>
     </dsp:sp>
   </dsp:spTree>
@@ -4211,7 +4214,7 @@
             <a:fld id="{724506C0-3FFE-45A5-803D-9F4FC5464A70}" type="datetimeFigureOut">
               <a:rPr lang="en-US" smtClean="0"/>
               <a:pPr/>
-              <a:t>10/24/2011</a:t>
+              <a:t>11/28/2011</a:t>
             </a:fld>
             <a:endParaRPr lang="en-US"/>
           </a:p>
@@ -4380,7 +4383,7 @@
     </p:spTree>
     <p:extLst>
       <p:ext uri="{BB962C8B-B14F-4D97-AF65-F5344CB8AC3E}">
-        <p14:creationId xmlns:p14="http://schemas.microsoft.com/office/powerpoint/2010/main" val="650118158"/>
+        <p14:creationId xmlns:p14="http://schemas.microsoft.com/office/powerpoint/2010/main" xmlns="" val="650118158"/>
       </p:ext>
     </p:extLst>
   </p:cSld>
@@ -5044,7 +5047,7 @@
             <a:fld id="{5E0C3846-8D4C-4326-8BC7-9B455A036298}" type="slidenum">
               <a:rPr lang="en-US" smtClean="0"/>
               <a:pPr/>
-              <a:t>5</a:t>
+              <a:t>9</a:t>
             </a:fld>
             <a:endParaRPr lang="en-US"/>
           </a:p>
@@ -5232,7 +5235,7 @@
             <a:fld id="{F922158D-428B-4987-8B28-745A2AFA1252}" type="datetimeFigureOut">
               <a:rPr lang="en-US" smtClean="0"/>
               <a:pPr/>
-              <a:t>10/24/2011</a:t>
+              <a:t>11/28/2011</a:t>
             </a:fld>
             <a:endParaRPr lang="en-US"/>
           </a:p>
@@ -5293,7 +5296,7 @@
           <a:blip r:embed="rId2" cstate="email">
             <a:extLst>
               <a:ext uri="{28A0092B-C50C-407E-A947-70E740481C1C}">
-                <a14:useLocalDpi xmlns:a14="http://schemas.microsoft.com/office/drawing/2010/main"/>
+                <a14:useLocalDpi xmlns:a14="http://schemas.microsoft.com/office/drawing/2010/main" xmlns=""/>
               </a:ext>
             </a:extLst>
           </a:blip>
@@ -5323,7 +5326,7 @@
           <a:blip r:embed="rId3" cstate="email">
             <a:extLst>
               <a:ext uri="{28A0092B-C50C-407E-A947-70E740481C1C}">
-                <a14:useLocalDpi xmlns:a14="http://schemas.microsoft.com/office/drawing/2010/main"/>
+                <a14:useLocalDpi xmlns:a14="http://schemas.microsoft.com/office/drawing/2010/main" xmlns=""/>
               </a:ext>
             </a:extLst>
           </a:blip>
@@ -5362,7 +5365,7 @@
           <a:blip r:embed="rId4" cstate="email">
             <a:extLst>
               <a:ext uri="{28A0092B-C50C-407E-A947-70E740481C1C}">
-                <a14:useLocalDpi xmlns:a14="http://schemas.microsoft.com/office/drawing/2010/main"/>
+                <a14:useLocalDpi xmlns:a14="http://schemas.microsoft.com/office/drawing/2010/main" xmlns=""/>
               </a:ext>
             </a:extLst>
           </a:blip>
@@ -5401,7 +5404,7 @@
           <a:blip r:embed="rId5" cstate="email">
             <a:extLst>
               <a:ext uri="{28A0092B-C50C-407E-A947-70E740481C1C}">
-                <a14:useLocalDpi xmlns:a14="http://schemas.microsoft.com/office/drawing/2010/main"/>
+                <a14:useLocalDpi xmlns:a14="http://schemas.microsoft.com/office/drawing/2010/main" xmlns=""/>
               </a:ext>
             </a:extLst>
           </a:blip>
@@ -5962,7 +5965,7 @@
             <a:fld id="{F922158D-428B-4987-8B28-745A2AFA1252}" type="datetimeFigureOut">
               <a:rPr lang="en-US" smtClean="0"/>
               <a:pPr/>
-              <a:t>10/24/2011</a:t>
+              <a:t>11/28/2011</a:t>
             </a:fld>
             <a:endParaRPr lang="en-US"/>
           </a:p>
@@ -6149,7 +6152,7 @@
             <a:fld id="{F922158D-428B-4987-8B28-745A2AFA1252}" type="datetimeFigureOut">
               <a:rPr lang="en-US" smtClean="0"/>
               <a:pPr/>
-              <a:t>10/24/2011</a:t>
+              <a:t>11/28/2011</a:t>
             </a:fld>
             <a:endParaRPr lang="en-US"/>
           </a:p>
@@ -6326,7 +6329,7 @@
             <a:fld id="{F922158D-428B-4987-8B28-745A2AFA1252}" type="datetimeFigureOut">
               <a:rPr lang="en-US" smtClean="0"/>
               <a:pPr/>
-              <a:t>10/24/2011</a:t>
+              <a:t>11/28/2011</a:t>
             </a:fld>
             <a:endParaRPr lang="en-US"/>
           </a:p>
@@ -6580,7 +6583,7 @@
             <a:fld id="{F922158D-428B-4987-8B28-745A2AFA1252}" type="datetimeFigureOut">
               <a:rPr lang="en-US" smtClean="0"/>
               <a:pPr/>
-              <a:t>10/24/2011</a:t>
+              <a:t>11/28/2011</a:t>
             </a:fld>
             <a:endParaRPr lang="en-US"/>
           </a:p>
@@ -6664,7 +6667,7 @@
           <a:blip r:embed="rId3" cstate="email">
             <a:extLst>
               <a:ext uri="{28A0092B-C50C-407E-A947-70E740481C1C}">
-                <a14:useLocalDpi xmlns:a14="http://schemas.microsoft.com/office/drawing/2010/main"/>
+                <a14:useLocalDpi xmlns:a14="http://schemas.microsoft.com/office/drawing/2010/main" xmlns=""/>
               </a:ext>
             </a:extLst>
           </a:blip>
@@ -7110,7 +7113,7 @@
             <a:fld id="{F922158D-428B-4987-8B28-745A2AFA1252}" type="datetimeFigureOut">
               <a:rPr lang="en-US" smtClean="0"/>
               <a:pPr/>
-              <a:t>10/24/2011</a:t>
+              <a:t>11/28/2011</a:t>
             </a:fld>
             <a:endParaRPr lang="en-US"/>
           </a:p>
@@ -7500,7 +7503,7 @@
             <a:fld id="{F922158D-428B-4987-8B28-745A2AFA1252}" type="datetimeFigureOut">
               <a:rPr lang="en-US" smtClean="0"/>
               <a:pPr/>
-              <a:t>10/24/2011</a:t>
+              <a:t>11/28/2011</a:t>
             </a:fld>
             <a:endParaRPr lang="en-US"/>
           </a:p>
@@ -7662,7 +7665,7 @@
             <a:fld id="{F922158D-428B-4987-8B28-745A2AFA1252}" type="datetimeFigureOut">
               <a:rPr lang="en-US" smtClean="0"/>
               <a:pPr/>
-              <a:t>10/24/2011</a:t>
+              <a:t>11/28/2011</a:t>
             </a:fld>
             <a:endParaRPr lang="en-US"/>
           </a:p>
@@ -7764,7 +7767,7 @@
             <a:fld id="{F922158D-428B-4987-8B28-745A2AFA1252}" type="datetimeFigureOut">
               <a:rPr lang="en-US" smtClean="0"/>
               <a:pPr/>
-              <a:t>10/24/2011</a:t>
+              <a:t>11/28/2011</a:t>
             </a:fld>
             <a:endParaRPr lang="en-US"/>
           </a:p>
@@ -8037,7 +8040,7 @@
             <a:fld id="{F922158D-428B-4987-8B28-745A2AFA1252}" type="datetimeFigureOut">
               <a:rPr lang="en-US" smtClean="0"/>
               <a:pPr/>
-              <a:t>10/24/2011</a:t>
+              <a:t>11/28/2011</a:t>
             </a:fld>
             <a:endParaRPr lang="en-US"/>
           </a:p>
@@ -8337,7 +8340,7 @@
             <a:fld id="{F922158D-428B-4987-8B28-745A2AFA1252}" type="datetimeFigureOut">
               <a:rPr lang="en-US" smtClean="0"/>
               <a:pPr/>
-              <a:t>10/24/2011</a:t>
+              <a:t>11/28/2011</a:t>
             </a:fld>
             <a:endParaRPr lang="en-US"/>
           </a:p>
@@ -9120,7 +9123,7 @@
             <a:fld id="{F922158D-428B-4987-8B28-745A2AFA1252}" type="datetimeFigureOut">
               <a:rPr lang="en-US" smtClean="0"/>
               <a:pPr/>
-              <a:t>10/24/2011</a:t>
+              <a:t>11/28/2011</a:t>
             </a:fld>
             <a:endParaRPr lang="en-US"/>
           </a:p>
@@ -9867,7 +9870,11 @@
             <a:pPr algn="ctr"/>
             <a:r>
               <a:rPr lang="en-US" dirty="0" smtClean="0"/>
-              <a:t>25 Oct 2011</a:t>
+              <a:t>29 Nov </a:t>
+            </a:r>
+            <a:r>
+              <a:rPr lang="en-US" dirty="0" smtClean="0"/>
+              <a:t>2011</a:t>
             </a:r>
           </a:p>
         </p:txBody>
@@ -9876,6 +9883,77 @@
     <p:custDataLst>
       <p:tags r:id="rId1"/>
     </p:custDataLst>
+  </p:cSld>
+  <p:clrMapOvr>
+    <a:masterClrMapping/>
+  </p:clrMapOvr>
+  <p:transition spd="slow">
+    <p:fade/>
+  </p:transition>
+  <p:timing>
+    <p:tnLst>
+      <p:par>
+        <p:cTn id="1" dur="indefinite" restart="never" nodeType="tmRoot"/>
+      </p:par>
+    </p:tnLst>
+  </p:timing>
+</p:sld>
+</file>
+
+<file path=ppt/slides/slide10.xml><?xml version="1.0" encoding="utf-8"?>
+<p:sld xmlns:a="http://schemas.openxmlformats.org/drawingml/2006/main" xmlns:r="http://schemas.openxmlformats.org/officeDocument/2006/relationships" xmlns:p="http://schemas.openxmlformats.org/presentationml/2006/main">
+  <p:cSld>
+    <p:spTree>
+      <p:nvGrpSpPr>
+        <p:cNvPr id="1" name=""/>
+        <p:cNvGrpSpPr/>
+        <p:nvPr/>
+      </p:nvGrpSpPr>
+      <p:grpSpPr>
+        <a:xfrm>
+          <a:off x="0" y="0"/>
+          <a:ext cx="0" cy="0"/>
+          <a:chOff x="0" y="0"/>
+          <a:chExt cx="0" cy="0"/>
+        </a:xfrm>
+      </p:grpSpPr>
+      <p:sp>
+        <p:nvSpPr>
+          <p:cNvPr id="2" name="Title 1"/>
+          <p:cNvSpPr>
+            <a:spLocks noGrp="1"/>
+          </p:cNvSpPr>
+          <p:nvPr>
+            <p:ph type="title"/>
+          </p:nvPr>
+        </p:nvSpPr>
+        <p:spPr>
+          <a:xfrm>
+            <a:off x="381000" y="1752600"/>
+            <a:ext cx="8229600" cy="2133600"/>
+          </a:xfrm>
+        </p:spPr>
+        <p:txBody>
+          <a:bodyPr>
+            <a:normAutofit/>
+          </a:bodyPr>
+          <a:lstStyle/>
+          <a:p>
+            <a:pPr algn="ctr"/>
+            <a:r>
+              <a:rPr lang="en-US" sz="8000" b="1" dirty="0" smtClean="0"/>
+              <a:t>Questions?</a:t>
+            </a:r>
+            <a:endParaRPr lang="en-US" sz="8000" b="1" dirty="0"/>
+          </a:p>
+        </p:txBody>
+      </p:sp>
+    </p:spTree>
+    <p:extLst>
+      <p:ext uri="{BB962C8B-B14F-4D97-AF65-F5344CB8AC3E}">
+        <p14:creationId xmlns:p14="http://schemas.microsoft.com/office/powerpoint/2010/main" xmlns="" val="1933149179"/>
+      </p:ext>
+    </p:extLst>
   </p:cSld>
   <p:clrMapOvr>
     <a:masterClrMapping/>
@@ -10024,7 +10102,7 @@
     </p:spTree>
     <p:extLst>
       <p:ext uri="{BB962C8B-B14F-4D97-AF65-F5344CB8AC3E}">
-        <p14:creationId xmlns:p14="http://schemas.microsoft.com/office/powerpoint/2010/main" val="3818610722"/>
+        <p14:creationId xmlns:p14="http://schemas.microsoft.com/office/powerpoint/2010/main" xmlns="" val="3818610722"/>
       </p:ext>
     </p:extLst>
   </p:cSld>
@@ -10146,7 +10224,7 @@
           <a:blip r:embed="rId4" cstate="print">
             <a:extLst>
               <a:ext uri="{28A0092B-C50C-407E-A947-70E740481C1C}">
-                <a14:useLocalDpi xmlns:a14="http://schemas.microsoft.com/office/drawing/2010/main" val="0"/>
+                <a14:useLocalDpi xmlns:a14="http://schemas.microsoft.com/office/drawing/2010/main" xmlns="" val="0"/>
               </a:ext>
             </a:extLst>
           </a:blip>
@@ -10166,7 +10244,7 @@
           <a:noFill/>
           <a:extLst>
             <a:ext uri="{909E8E84-426E-40DD-AFC4-6F175D3DCCD1}">
-              <a14:hiddenFill xmlns:a14="http://schemas.microsoft.com/office/drawing/2010/main">
+              <a14:hiddenFill xmlns:a14="http://schemas.microsoft.com/office/drawing/2010/main" xmlns="">
                 <a:solidFill>
                   <a:srgbClr val="FFFFFF"/>
                 </a:solidFill>
@@ -10187,7 +10265,7 @@
           <a:blip r:embed="rId5" cstate="email">
             <a:extLst>
               <a:ext uri="{28A0092B-C50C-407E-A947-70E740481C1C}">
-                <a14:useLocalDpi xmlns:a14="http://schemas.microsoft.com/office/drawing/2010/main" val="0"/>
+                <a14:useLocalDpi xmlns:a14="http://schemas.microsoft.com/office/drawing/2010/main" xmlns="" val="0"/>
               </a:ext>
             </a:extLst>
           </a:blip>
@@ -10207,7 +10285,7 @@
           <a:noFill/>
           <a:extLst>
             <a:ext uri="{909E8E84-426E-40DD-AFC4-6F175D3DCCD1}">
-              <a14:hiddenFill xmlns:a14="http://schemas.microsoft.com/office/drawing/2010/main">
+              <a14:hiddenFill xmlns:a14="http://schemas.microsoft.com/office/drawing/2010/main" xmlns="">
                 <a:solidFill>
                   <a:srgbClr val="FFFFFF"/>
                 </a:solidFill>
@@ -10300,7 +10378,7 @@
             </p:custDataLst>
             <p:extLst>
               <p:ext uri="{D42A27DB-BD31-4B8C-83A1-F6EECF244321}">
-                <p14:modId xmlns:p14="http://schemas.microsoft.com/office/powerpoint/2010/main" val="69745022"/>
+                <p14:modId xmlns:p14="http://schemas.microsoft.com/office/powerpoint/2010/main" xmlns="" val="69745022"/>
               </p:ext>
             </p:extLst>
           </p:nvPr>
@@ -10522,38 +10600,51 @@
             </p:custDataLst>
           </p:nvPr>
         </p:nvSpPr>
-        <p:spPr/>
+        <p:spPr>
+          <a:xfrm>
+            <a:off x="457200" y="914400"/>
+            <a:ext cx="5410200" cy="914400"/>
+          </a:xfrm>
+        </p:spPr>
+        <p:txBody>
+          <a:bodyPr>
+            <a:noAutofit/>
+          </a:bodyPr>
+          <a:lstStyle/>
+          <a:p>
+            <a:r>
+              <a:rPr lang="en-US" sz="6000" b="1" dirty="0" smtClean="0"/>
+              <a:t>Assignments</a:t>
+            </a:r>
+            <a:endParaRPr lang="en-US" sz="6000" b="1" dirty="0"/>
+          </a:p>
+        </p:txBody>
+      </p:sp>
+      <p:sp>
+        <p:nvSpPr>
+          <p:cNvPr id="3" name="Content Placeholder 2"/>
+          <p:cNvSpPr>
+            <a:spLocks noGrp="1"/>
+          </p:cNvSpPr>
+          <p:nvPr>
+            <p:ph idx="1"/>
+            <p:custDataLst>
+              <p:tags r:id="rId3"/>
+            </p:custDataLst>
+          </p:nvPr>
+        </p:nvSpPr>
+        <p:spPr>
+          <a:xfrm>
+            <a:off x="457200" y="1828800"/>
+            <a:ext cx="5257800" cy="4297363"/>
+          </a:xfrm>
+        </p:spPr>
         <p:txBody>
           <a:bodyPr>
             <a:normAutofit/>
           </a:bodyPr>
           <a:lstStyle/>
           <a:p>
-            <a:r>
-              <a:rPr lang="en-US" sz="6000" b="1" dirty="0" smtClean="0"/>
-              <a:t>Current Status</a:t>
-            </a:r>
-            <a:endParaRPr lang="en-US" sz="6000" b="1" dirty="0"/>
-          </a:p>
-        </p:txBody>
-      </p:sp>
-      <p:sp>
-        <p:nvSpPr>
-          <p:cNvPr id="4" name="Content Placeholder 3"/>
-          <p:cNvSpPr>
-            <a:spLocks noGrp="1"/>
-          </p:cNvSpPr>
-          <p:nvPr>
-            <p:ph idx="1"/>
-          </p:nvPr>
-        </p:nvSpPr>
-        <p:spPr/>
-        <p:txBody>
-          <a:bodyPr>
-            <a:normAutofit lnSpcReduction="10000"/>
-          </a:bodyPr>
-          <a:lstStyle/>
-          <a:p>
             <a:pPr>
               <a:lnSpc>
                 <a:spcPct val="150000"/>
@@ -10561,41 +10652,29 @@
             </a:pPr>
             <a:r>
               <a:rPr lang="en-US" dirty="0" smtClean="0"/>
-              <a:t>Progress that </a:t>
-            </a:r>
-            <a:r>
-              <a:rPr lang="en-US" dirty="0"/>
-              <a:t>has been </a:t>
-            </a:r>
-            <a:r>
-              <a:rPr lang="en-US" dirty="0" smtClean="0"/>
-              <a:t>made:</a:t>
-            </a:r>
-            <a:endParaRPr lang="en-US" dirty="0"/>
-          </a:p>
-          <a:p>
-            <a:pPr lvl="1">
+              <a:t>Christian Williams</a:t>
+            </a:r>
+          </a:p>
+          <a:p>
+            <a:pPr marL="514350" indent="-514350">
               <a:lnSpc>
                 <a:spcPct val="150000"/>
               </a:lnSpc>
+              <a:buFont typeface="+mj-lt"/>
+              <a:buAutoNum type="arabicPeriod"/>
             </a:pPr>
             <a:r>
               <a:rPr lang="en-US" dirty="0" smtClean="0"/>
-              <a:t>Communication between Kinect and Second Life</a:t>
-            </a:r>
-            <a:endParaRPr lang="en-US" dirty="0"/>
-          </a:p>
-          <a:p>
-            <a:pPr lvl="1">
-              <a:lnSpc>
-                <a:spcPct val="150000"/>
-              </a:lnSpc>
-            </a:pPr>
+              <a:t>Design and Network </a:t>
+            </a:r>
+            <a:r>
+              <a:rPr lang="en-US" dirty="0" err="1" smtClean="0"/>
+              <a:t>Comms</a:t>
+            </a:r>
             <a:r>
               <a:rPr lang="en-US" dirty="0" smtClean="0"/>
-              <a:t>Rudimentary gesture events written with corresponding actions in Second Life</a:t>
-            </a:r>
-            <a:endParaRPr lang="en-US" dirty="0"/>
+              <a:t>. </a:t>
+            </a:r>
           </a:p>
           <a:p>
             <a:pPr>
@@ -10605,41 +10684,113 @@
             </a:pPr>
             <a:r>
               <a:rPr lang="en-US" dirty="0" smtClean="0"/>
-              <a:t>Next Steps:</a:t>
-            </a:r>
-            <a:endParaRPr lang="en-US" dirty="0"/>
-          </a:p>
-          <a:p>
-            <a:pPr lvl="1">
+              <a:t>Francis </a:t>
+            </a:r>
+            <a:r>
+              <a:rPr lang="en-US" dirty="0" err="1" smtClean="0"/>
+              <a:t>Sabado</a:t>
+            </a:r>
+            <a:endParaRPr lang="en-US" dirty="0" smtClean="0"/>
+          </a:p>
+          <a:p>
+            <a:pPr marL="514350" indent="-514350">
+              <a:lnSpc>
+                <a:spcPct val="150000"/>
+              </a:lnSpc>
+              <a:buFont typeface="+mj-lt"/>
+              <a:buAutoNum type="arabicPeriod"/>
+            </a:pPr>
+            <a:r>
+              <a:rPr lang="en-US" dirty="0" smtClean="0"/>
+              <a:t>Game Implementation</a:t>
+            </a:r>
+            <a:endParaRPr lang="en-US" dirty="0" smtClean="0"/>
+          </a:p>
+          <a:p>
+            <a:pPr>
               <a:lnSpc>
                 <a:spcPct val="150000"/>
               </a:lnSpc>
             </a:pPr>
             <a:r>
               <a:rPr lang="en-US" dirty="0" smtClean="0"/>
-              <a:t>Need to develop the game engine</a:t>
-            </a:r>
-          </a:p>
-          <a:p>
-            <a:pPr lvl="1">
+              <a:t>Aaron Mahmoud</a:t>
+            </a:r>
+          </a:p>
+          <a:p>
+            <a:pPr marL="514350" indent="-514350">
               <a:lnSpc>
                 <a:spcPct val="150000"/>
               </a:lnSpc>
+              <a:buFont typeface="+mj-lt"/>
+              <a:buAutoNum type="arabicPeriod"/>
             </a:pPr>
             <a:r>
+              <a:rPr lang="en-US" dirty="0"/>
+              <a:t>G</a:t>
+            </a:r>
+            <a:r>
               <a:rPr lang="en-US" dirty="0" smtClean="0"/>
-              <a:t>Need to develop complex gestures and voice recognition</a:t>
-            </a:r>
-            <a:endParaRPr lang="en-US" dirty="0"/>
-          </a:p>
-          <a:p>
-            <a:pPr marL="0" indent="0">
-              <a:buNone/>
+              <a:t>estures </a:t>
+            </a:r>
+            <a:r>
+              <a:rPr lang="en-US" dirty="0"/>
+              <a:t>and voice control</a:t>
+            </a:r>
+          </a:p>
+          <a:p>
+            <a:pPr marL="514350" indent="-514350">
+              <a:lnSpc>
+                <a:spcPct val="150000"/>
+              </a:lnSpc>
+              <a:buFont typeface="+mj-lt"/>
+              <a:buAutoNum type="arabicPeriod"/>
             </a:pPr>
-            <a:endParaRPr lang="en-US" dirty="0"/>
+            <a:endParaRPr lang="en-US" dirty="0" smtClean="0"/>
           </a:p>
         </p:txBody>
       </p:sp>
+      <p:pic>
+        <p:nvPicPr>
+          <p:cNvPr id="2050" name="Picture 2" descr="C:\Users\aDemoNnDisguisE\Desktop\r-2854-5321.jpg"/>
+          <p:cNvPicPr>
+            <a:picLocks noChangeAspect="1" noChangeArrowheads="1"/>
+          </p:cNvPicPr>
+          <p:nvPr/>
+        </p:nvPicPr>
+        <p:blipFill>
+          <a:blip r:embed="rId5" cstate="print">
+            <a:extLst>
+              <a:ext uri="{28A0092B-C50C-407E-A947-70E740481C1C}">
+                <a14:useLocalDpi xmlns:a14="http://schemas.microsoft.com/office/drawing/2010/main" xmlns="" val="0"/>
+              </a:ext>
+            </a:extLst>
+          </a:blip>
+          <a:srcRect/>
+          <a:stretch>
+            <a:fillRect/>
+          </a:stretch>
+        </p:blipFill>
+        <p:spPr bwMode="auto">
+          <a:xfrm>
+            <a:off x="5715000" y="990600"/>
+            <a:ext cx="3048000" cy="5410200"/>
+          </a:xfrm>
+          <a:prstGeom prst="rect">
+            <a:avLst/>
+          </a:prstGeom>
+          <a:noFill/>
+          <a:extLst>
+            <a:ext uri="{909E8E84-426E-40DD-AFC4-6F175D3DCCD1}">
+              <a14:hiddenFill xmlns:a14="http://schemas.microsoft.com/office/drawing/2010/main" xmlns="">
+                <a:solidFill>
+                  <a:srgbClr val="FFFFFF"/>
+                </a:solidFill>
+              </a14:hiddenFill>
+            </a:ext>
+          </a:extLst>
+        </p:spPr>
+      </p:pic>
     </p:spTree>
     <p:custDataLst>
       <p:tags r:id="rId1"/>
@@ -10686,180 +10837,33 @@
           </p:cNvSpPr>
           <p:nvPr>
             <p:ph type="title"/>
-            <p:custDataLst>
-              <p:tags r:id="rId2"/>
-            </p:custDataLst>
           </p:nvPr>
         </p:nvSpPr>
-        <p:spPr>
-          <a:xfrm>
-            <a:off x="457200" y="914400"/>
-            <a:ext cx="5410200" cy="914400"/>
-          </a:xfrm>
-        </p:spPr>
+        <p:spPr/>
         <p:txBody>
-          <a:bodyPr>
-            <a:noAutofit/>
-          </a:bodyPr>
+          <a:bodyPr/>
           <a:lstStyle/>
           <a:p>
             <a:r>
-              <a:rPr lang="en-US" sz="6000" b="1" dirty="0" smtClean="0"/>
-              <a:t>Assignments</a:t>
-            </a:r>
-            <a:endParaRPr lang="en-US" sz="6000" b="1" dirty="0"/>
-          </a:p>
-        </p:txBody>
-      </p:sp>
-      <p:sp>
-        <p:nvSpPr>
-          <p:cNvPr id="3" name="Content Placeholder 2"/>
-          <p:cNvSpPr>
-            <a:spLocks noGrp="1"/>
-          </p:cNvSpPr>
-          <p:nvPr>
-            <p:ph idx="1"/>
-            <p:custDataLst>
-              <p:tags r:id="rId3"/>
-            </p:custDataLst>
-          </p:nvPr>
-        </p:nvSpPr>
-        <p:spPr>
-          <a:xfrm>
-            <a:off x="457200" y="1828800"/>
-            <a:ext cx="5257800" cy="4297363"/>
-          </a:xfrm>
-        </p:spPr>
-        <p:txBody>
-          <a:bodyPr>
-            <a:normAutofit/>
-          </a:bodyPr>
-          <a:lstStyle/>
-          <a:p>
-            <a:pPr>
-              <a:lnSpc>
-                <a:spcPct val="150000"/>
-              </a:lnSpc>
-            </a:pPr>
-            <a:r>
               <a:rPr lang="en-US" dirty="0" smtClean="0"/>
-              <a:t>Christian Williams</a:t>
-            </a:r>
-          </a:p>
-          <a:p>
-            <a:pPr marL="514350" indent="-514350">
-              <a:lnSpc>
-                <a:spcPct val="150000"/>
-              </a:lnSpc>
-              <a:buFont typeface="+mj-lt"/>
-              <a:buAutoNum type="arabicPeriod"/>
-            </a:pPr>
-            <a:r>
-              <a:rPr lang="en-US" dirty="0" smtClean="0"/>
-              <a:t>Design and Network </a:t>
-            </a:r>
-            <a:r>
-              <a:rPr lang="en-US" dirty="0" err="1" smtClean="0"/>
-              <a:t>Comms</a:t>
-            </a:r>
-            <a:r>
-              <a:rPr lang="en-US" dirty="0" smtClean="0"/>
-              <a:t>. </a:t>
-            </a:r>
-          </a:p>
-          <a:p>
-            <a:pPr>
-              <a:lnSpc>
-                <a:spcPct val="150000"/>
-              </a:lnSpc>
-            </a:pPr>
-            <a:r>
-              <a:rPr lang="en-US" dirty="0" smtClean="0"/>
-              <a:t>Francis </a:t>
-            </a:r>
-            <a:r>
-              <a:rPr lang="en-US" dirty="0" err="1" smtClean="0"/>
-              <a:t>Sabado</a:t>
-            </a:r>
-            <a:endParaRPr lang="en-US" dirty="0" smtClean="0"/>
-          </a:p>
-          <a:p>
-            <a:pPr marL="514350" indent="-514350">
-              <a:lnSpc>
-                <a:spcPct val="150000"/>
-              </a:lnSpc>
-              <a:buFont typeface="+mj-lt"/>
-              <a:buAutoNum type="arabicPeriod"/>
-            </a:pPr>
-            <a:r>
-              <a:rPr lang="en-US" dirty="0"/>
-              <a:t>Game Engine </a:t>
-            </a:r>
-            <a:r>
-              <a:rPr lang="en-US" dirty="0" smtClean="0"/>
-              <a:t>Implementation</a:t>
-            </a:r>
-          </a:p>
-          <a:p>
-            <a:pPr>
-              <a:lnSpc>
-                <a:spcPct val="150000"/>
-              </a:lnSpc>
-            </a:pPr>
-            <a:r>
-              <a:rPr lang="en-US" dirty="0" smtClean="0"/>
-              <a:t>Aaron Mahmoud</a:t>
-            </a:r>
-          </a:p>
-          <a:p>
-            <a:pPr marL="514350" indent="-514350">
-              <a:lnSpc>
-                <a:spcPct val="150000"/>
-              </a:lnSpc>
-              <a:buFont typeface="+mj-lt"/>
-              <a:buAutoNum type="arabicPeriod"/>
-            </a:pPr>
-            <a:r>
-              <a:rPr lang="en-US" dirty="0"/>
-              <a:t>G</a:t>
-            </a:r>
-            <a:r>
-              <a:rPr lang="en-US" dirty="0" smtClean="0"/>
-              <a:t>estures </a:t>
-            </a:r>
-            <a:r>
-              <a:rPr lang="en-US" dirty="0"/>
-              <a:t>and voice control</a:t>
-            </a:r>
-          </a:p>
-          <a:p>
-            <a:pPr marL="514350" indent="-514350">
-              <a:lnSpc>
-                <a:spcPct val="150000"/>
-              </a:lnSpc>
-              <a:buFont typeface="+mj-lt"/>
-              <a:buAutoNum type="arabicPeriod"/>
-            </a:pPr>
-            <a:endParaRPr lang="en-US" dirty="0" smtClean="0"/>
+              <a:t>Angry Prim Game</a:t>
+            </a:r>
+            <a:endParaRPr lang="en-US" dirty="0"/>
           </a:p>
         </p:txBody>
       </p:sp>
       <p:pic>
         <p:nvPicPr>
-          <p:cNvPr id="2050" name="Picture 2" descr="C:\Users\aDemoNnDisguisE\Desktop\r-2854-5321.jpg"/>
+          <p:cNvPr id="1026" name="Picture 2"/>
           <p:cNvPicPr>
-            <a:picLocks noChangeAspect="1" noChangeArrowheads="1"/>
+            <a:picLocks noGrp="1" noChangeAspect="1" noChangeArrowheads="1"/>
           </p:cNvPicPr>
-          <p:nvPr/>
+          <p:nvPr>
+            <p:ph idx="1"/>
+          </p:nvPr>
         </p:nvPicPr>
         <p:blipFill>
-          <a:blip r:embed="rId5" cstate="print">
-            <a:extLst>
-              <a:ext uri="{28A0092B-C50C-407E-A947-70E740481C1C}">
-                <a14:useLocalDpi xmlns:a14="http://schemas.microsoft.com/office/drawing/2010/main" val="0"/>
-              </a:ext>
-            </a:extLst>
-          </a:blip>
+          <a:blip r:embed="rId2" cstate="print"/>
           <a:srcRect/>
           <a:stretch>
             <a:fillRect/>
@@ -10867,28 +10871,156 @@
         </p:blipFill>
         <p:spPr bwMode="auto">
           <a:xfrm>
-            <a:off x="5715000" y="990600"/>
-            <a:ext cx="3048000" cy="5410200"/>
+            <a:off x="3124200" y="2133600"/>
+            <a:ext cx="5867400" cy="4107180"/>
           </a:xfrm>
           <a:prstGeom prst="rect">
             <a:avLst/>
           </a:prstGeom>
           <a:noFill/>
-          <a:extLst>
-            <a:ext uri="{909E8E84-426E-40DD-AFC4-6F175D3DCCD1}">
-              <a14:hiddenFill xmlns:a14="http://schemas.microsoft.com/office/drawing/2010/main">
-                <a:solidFill>
-                  <a:srgbClr val="FFFFFF"/>
-                </a:solidFill>
-              </a14:hiddenFill>
-            </a:ext>
-          </a:extLst>
+          <a:ln w="9525">
+            <a:noFill/>
+            <a:miter lim="800000"/>
+            <a:headEnd/>
+            <a:tailEnd/>
+          </a:ln>
         </p:spPr>
       </p:pic>
+      <p:sp>
+        <p:nvSpPr>
+          <p:cNvPr id="8" name="TextBox 7"/>
+          <p:cNvSpPr txBox="1"/>
+          <p:nvPr/>
+        </p:nvSpPr>
+        <p:spPr>
+          <a:xfrm>
+            <a:off x="304800" y="2438400"/>
+            <a:ext cx="2667000" cy="3385542"/>
+          </a:xfrm>
+          <a:prstGeom prst="rect">
+            <a:avLst/>
+          </a:prstGeom>
+          <a:noFill/>
+        </p:spPr>
+        <p:txBody>
+          <a:bodyPr wrap="square" rtlCol="0">
+            <a:spAutoFit/>
+          </a:bodyPr>
+          <a:lstStyle/>
+          <a:p>
+            <a:pPr marL="274320" indent="-274320">
+              <a:spcBef>
+                <a:spcPct val="20000"/>
+              </a:spcBef>
+              <a:buClr>
+                <a:schemeClr val="accent3"/>
+              </a:buClr>
+              <a:buSzPct val="95000"/>
+              <a:buFont typeface="Wingdings 2"/>
+              <a:buChar char=""/>
+            </a:pPr>
+            <a:r>
+              <a:rPr lang="en-US" sz="2800" dirty="0" smtClean="0"/>
+              <a:t>Projectile:</a:t>
+            </a:r>
+          </a:p>
+          <a:p>
+            <a:pPr marL="274320" indent="-274320">
+              <a:spcBef>
+                <a:spcPct val="20000"/>
+              </a:spcBef>
+              <a:buClr>
+                <a:schemeClr val="accent3"/>
+              </a:buClr>
+              <a:buSzPct val="95000"/>
+            </a:pPr>
+            <a:r>
+              <a:rPr lang="en-US" sz="2800" dirty="0" smtClean="0"/>
+              <a:t> Angry </a:t>
+            </a:r>
+            <a:r>
+              <a:rPr lang="en-US" sz="2800" dirty="0" smtClean="0"/>
+              <a:t>Birds</a:t>
+            </a:r>
+          </a:p>
+          <a:p>
+            <a:pPr marL="274320" indent="-274320">
+              <a:spcBef>
+                <a:spcPct val="20000"/>
+              </a:spcBef>
+              <a:buClr>
+                <a:schemeClr val="accent3"/>
+              </a:buClr>
+              <a:buSzPct val="95000"/>
+              <a:buFont typeface="Wingdings 2"/>
+              <a:buChar char=""/>
+            </a:pPr>
+            <a:r>
+              <a:rPr lang="en-US" sz="2800" dirty="0" smtClean="0"/>
+              <a:t>Slingshot</a:t>
+            </a:r>
+            <a:endParaRPr lang="en-US" sz="2800" dirty="0" smtClean="0"/>
+          </a:p>
+          <a:p>
+            <a:pPr marL="274320" indent="-274320">
+              <a:spcBef>
+                <a:spcPct val="20000"/>
+              </a:spcBef>
+              <a:buClr>
+                <a:schemeClr val="accent3"/>
+              </a:buClr>
+              <a:buSzPct val="95000"/>
+              <a:buFont typeface="Wingdings 2"/>
+              <a:buChar char=""/>
+            </a:pPr>
+            <a:r>
+              <a:rPr lang="en-US" sz="2800" dirty="0" smtClean="0"/>
+              <a:t>Obstacles</a:t>
+            </a:r>
+          </a:p>
+          <a:p>
+            <a:pPr marL="274320" indent="-274320">
+              <a:spcBef>
+                <a:spcPct val="20000"/>
+              </a:spcBef>
+              <a:buClr>
+                <a:schemeClr val="accent3"/>
+              </a:buClr>
+              <a:buSzPct val="95000"/>
+              <a:buFont typeface="Wingdings 2"/>
+              <a:buChar char=""/>
+            </a:pPr>
+            <a:r>
+              <a:rPr lang="en-US" sz="2800" dirty="0" smtClean="0"/>
+              <a:t>Targets: </a:t>
+            </a:r>
+          </a:p>
+          <a:p>
+            <a:pPr marL="274320" indent="-274320">
+              <a:spcBef>
+                <a:spcPct val="20000"/>
+              </a:spcBef>
+              <a:buClr>
+                <a:schemeClr val="accent3"/>
+              </a:buClr>
+              <a:buSzPct val="95000"/>
+            </a:pPr>
+            <a:r>
+              <a:rPr lang="en-US" sz="2800" dirty="0" smtClean="0"/>
+              <a:t> </a:t>
+            </a:r>
+            <a:r>
+              <a:rPr lang="en-US" sz="2800" dirty="0" smtClean="0"/>
+              <a:t>Pigs</a:t>
+            </a:r>
+            <a:endParaRPr lang="en-US" sz="2800" dirty="0" smtClean="0"/>
+          </a:p>
+          <a:p>
+            <a:endParaRPr lang="en-US" dirty="0"/>
+          </a:p>
+        </p:txBody>
+      </p:sp>
     </p:spTree>
-    <p:custDataLst>
-      <p:tags r:id="rId1"/>
-    </p:custDataLst>
   </p:cSld>
   <p:clrMapOvr>
     <a:masterClrMapping/>
@@ -10923,6 +11055,40 @@
           <a:chExt cx="0" cy="0"/>
         </a:xfrm>
       </p:grpSpPr>
+      <p:pic>
+        <p:nvPicPr>
+          <p:cNvPr id="2050" name="Picture 2"/>
+          <p:cNvPicPr>
+            <a:picLocks noGrp="1" noChangeAspect="1" noChangeArrowheads="1"/>
+          </p:cNvPicPr>
+          <p:nvPr>
+            <p:ph idx="1"/>
+          </p:nvPr>
+        </p:nvPicPr>
+        <p:blipFill>
+          <a:blip r:embed="rId2" cstate="print"/>
+          <a:srcRect/>
+          <a:stretch>
+            <a:fillRect/>
+          </a:stretch>
+        </p:blipFill>
+        <p:spPr bwMode="auto">
+          <a:xfrm>
+            <a:off x="838200" y="2057400"/>
+            <a:ext cx="6743700" cy="4495800"/>
+          </a:xfrm>
+          <a:prstGeom prst="rect">
+            <a:avLst/>
+          </a:prstGeom>
+          <a:noFill/>
+          <a:ln w="9525">
+            <a:noFill/>
+            <a:miter lim="800000"/>
+            <a:headEnd/>
+            <a:tailEnd/>
+          </a:ln>
+        </p:spPr>
+      </p:pic>
       <p:sp>
         <p:nvSpPr>
           <p:cNvPr id="2" name="Title 1"/>
@@ -10933,33 +11099,457 @@
             <p:ph type="title"/>
           </p:nvPr>
         </p:nvSpPr>
+        <p:spPr/>
+        <p:txBody>
+          <a:bodyPr>
+            <a:normAutofit fontScale="90000"/>
+          </a:bodyPr>
+          <a:lstStyle/>
+          <a:p>
+            <a:r>
+              <a:rPr lang="en-US" dirty="0" smtClean="0"/>
+              <a:t>Trajectory, Physics, </a:t>
+            </a:r>
+            <a:br>
+              <a:rPr lang="en-US" dirty="0" smtClean="0"/>
+            </a:br>
+            <a:r>
+              <a:rPr lang="en-US" dirty="0" smtClean="0"/>
+              <a:t>Collision and Animation</a:t>
+            </a:r>
+            <a:endParaRPr lang="en-US" dirty="0"/>
+          </a:p>
+        </p:txBody>
+      </p:sp>
+      <p:sp>
+        <p:nvSpPr>
+          <p:cNvPr id="5" name="TextBox 4"/>
+          <p:cNvSpPr txBox="1"/>
+          <p:nvPr/>
+        </p:nvSpPr>
         <p:spPr>
           <a:xfrm>
-            <a:off x="381000" y="1752600"/>
-            <a:ext cx="8229600" cy="2133600"/>
+            <a:off x="838200" y="3505200"/>
+            <a:ext cx="1447800" cy="369332"/>
           </a:xfrm>
+          <a:prstGeom prst="rect">
+            <a:avLst/>
+          </a:prstGeom>
+          <a:noFill/>
         </p:spPr>
+        <p:txBody>
+          <a:bodyPr wrap="square" rtlCol="0">
+            <a:spAutoFit/>
+          </a:bodyPr>
+          <a:lstStyle/>
+          <a:p>
+            <a:r>
+              <a:rPr lang="en-US" b="1" dirty="0" smtClean="0">
+                <a:solidFill>
+                  <a:srgbClr val="FF0000"/>
+                </a:solidFill>
+              </a:rPr>
+              <a:t>Trajectory</a:t>
+            </a:r>
+            <a:endParaRPr lang="en-US" b="1" dirty="0">
+              <a:solidFill>
+                <a:srgbClr val="FF0000"/>
+              </a:solidFill>
+            </a:endParaRPr>
+          </a:p>
+        </p:txBody>
+      </p:sp>
+      <p:sp>
+        <p:nvSpPr>
+          <p:cNvPr id="6" name="TextBox 5"/>
+          <p:cNvSpPr txBox="1"/>
+          <p:nvPr/>
+        </p:nvSpPr>
+        <p:spPr>
+          <a:xfrm>
+            <a:off x="6248400" y="5257800"/>
+            <a:ext cx="1295400" cy="646331"/>
+          </a:xfrm>
+          <a:prstGeom prst="rect">
+            <a:avLst/>
+          </a:prstGeom>
+          <a:noFill/>
+        </p:spPr>
+        <p:txBody>
+          <a:bodyPr wrap="square" rtlCol="0">
+            <a:spAutoFit/>
+          </a:bodyPr>
+          <a:lstStyle/>
+          <a:p>
+            <a:r>
+              <a:rPr lang="en-US" b="1" dirty="0" smtClean="0">
+                <a:solidFill>
+                  <a:srgbClr val="FF0000"/>
+                </a:solidFill>
+              </a:rPr>
+              <a:t>Collision Detection</a:t>
+            </a:r>
+            <a:endParaRPr lang="en-US" b="1" dirty="0">
+              <a:solidFill>
+                <a:srgbClr val="FF0000"/>
+              </a:solidFill>
+            </a:endParaRPr>
+          </a:p>
+        </p:txBody>
+      </p:sp>
+      <p:sp>
+        <p:nvSpPr>
+          <p:cNvPr id="9" name="TextBox 8"/>
+          <p:cNvSpPr txBox="1"/>
+          <p:nvPr/>
+        </p:nvSpPr>
+        <p:spPr>
+          <a:xfrm>
+            <a:off x="2057400" y="2133600"/>
+            <a:ext cx="1295400" cy="369332"/>
+          </a:xfrm>
+          <a:prstGeom prst="rect">
+            <a:avLst/>
+          </a:prstGeom>
+          <a:noFill/>
+        </p:spPr>
+        <p:txBody>
+          <a:bodyPr wrap="square" rtlCol="0">
+            <a:spAutoFit/>
+          </a:bodyPr>
+          <a:lstStyle/>
+          <a:p>
+            <a:r>
+              <a:rPr lang="en-US" b="1" dirty="0" smtClean="0">
+                <a:solidFill>
+                  <a:srgbClr val="FF0000"/>
+                </a:solidFill>
+              </a:rPr>
+              <a:t>Physics</a:t>
+            </a:r>
+            <a:endParaRPr lang="en-US" b="1" dirty="0">
+              <a:solidFill>
+                <a:srgbClr val="FF0000"/>
+              </a:solidFill>
+            </a:endParaRPr>
+          </a:p>
+        </p:txBody>
+      </p:sp>
+      <p:sp>
+        <p:nvSpPr>
+          <p:cNvPr id="10" name="TextBox 9"/>
+          <p:cNvSpPr txBox="1"/>
+          <p:nvPr/>
+        </p:nvSpPr>
+        <p:spPr>
+          <a:xfrm>
+            <a:off x="2438400" y="3733800"/>
+            <a:ext cx="1371600" cy="369332"/>
+          </a:xfrm>
+          <a:prstGeom prst="rect">
+            <a:avLst/>
+          </a:prstGeom>
+          <a:noFill/>
+        </p:spPr>
+        <p:txBody>
+          <a:bodyPr wrap="square" rtlCol="0">
+            <a:spAutoFit/>
+          </a:bodyPr>
+          <a:lstStyle/>
+          <a:p>
+            <a:r>
+              <a:rPr lang="en-US" b="1" dirty="0" smtClean="0">
+                <a:solidFill>
+                  <a:srgbClr val="FF0000"/>
+                </a:solidFill>
+              </a:rPr>
+              <a:t>Animation</a:t>
+            </a:r>
+            <a:endParaRPr lang="en-US" b="1" dirty="0">
+              <a:solidFill>
+                <a:srgbClr val="FF0000"/>
+              </a:solidFill>
+            </a:endParaRPr>
+          </a:p>
+        </p:txBody>
+      </p:sp>
+    </p:spTree>
+  </p:cSld>
+  <p:clrMapOvr>
+    <a:masterClrMapping/>
+  </p:clrMapOvr>
+  <p:transition spd="slow">
+    <p:fade/>
+  </p:transition>
+  <p:timing>
+    <p:tnLst>
+      <p:par>
+        <p:cTn id="1" dur="indefinite" restart="never" nodeType="tmRoot"/>
+      </p:par>
+    </p:tnLst>
+  </p:timing>
+</p:sld>
+</file>
+
+<file path=ppt/slides/slide8.xml><?xml version="1.0" encoding="utf-8"?>
+<p:sld xmlns:a="http://schemas.openxmlformats.org/drawingml/2006/main" xmlns:r="http://schemas.openxmlformats.org/officeDocument/2006/relationships" xmlns:p="http://schemas.openxmlformats.org/presentationml/2006/main">
+  <p:cSld>
+    <p:spTree>
+      <p:nvGrpSpPr>
+        <p:cNvPr id="1" name=""/>
+        <p:cNvGrpSpPr/>
+        <p:nvPr/>
+      </p:nvGrpSpPr>
+      <p:grpSpPr>
+        <a:xfrm>
+          <a:off x="0" y="0"/>
+          <a:ext cx="0" cy="0"/>
+          <a:chOff x="0" y="0"/>
+          <a:chExt cx="0" cy="0"/>
+        </a:xfrm>
+      </p:grpSpPr>
+      <p:sp>
+        <p:nvSpPr>
+          <p:cNvPr id="2" name="Title 1"/>
+          <p:cNvSpPr>
+            <a:spLocks noGrp="1"/>
+          </p:cNvSpPr>
+          <p:nvPr>
+            <p:ph type="title"/>
+          </p:nvPr>
+        </p:nvSpPr>
+        <p:spPr/>
+        <p:txBody>
+          <a:bodyPr/>
+          <a:lstStyle/>
+          <a:p>
+            <a:r>
+              <a:rPr lang="en-US" dirty="0" smtClean="0"/>
+              <a:t>Game Limitations</a:t>
+            </a:r>
+            <a:endParaRPr lang="en-US" dirty="0"/>
+          </a:p>
+        </p:txBody>
+      </p:sp>
+      <p:sp>
+        <p:nvSpPr>
+          <p:cNvPr id="3" name="Content Placeholder 2"/>
+          <p:cNvSpPr>
+            <a:spLocks noGrp="1"/>
+          </p:cNvSpPr>
+          <p:nvPr>
+            <p:ph idx="1"/>
+          </p:nvPr>
+        </p:nvSpPr>
+        <p:spPr/>
+        <p:txBody>
+          <a:bodyPr>
+            <a:normAutofit fontScale="92500" lnSpcReduction="20000"/>
+          </a:bodyPr>
+          <a:lstStyle/>
+          <a:p>
+            <a:r>
+              <a:rPr lang="en-US" dirty="0" smtClean="0"/>
+              <a:t>Obstacle and target locations will be a fixed point.</a:t>
+            </a:r>
+          </a:p>
+          <a:p>
+            <a:endParaRPr lang="en-US" dirty="0" smtClean="0"/>
+          </a:p>
+          <a:p>
+            <a:r>
+              <a:rPr lang="en-US" dirty="0" smtClean="0"/>
+              <a:t>Game reset will require all objects to return to their previous states, therefore there must be a way to remember previous locations.</a:t>
+            </a:r>
+          </a:p>
+          <a:p>
+            <a:endParaRPr lang="en-US" dirty="0" smtClean="0"/>
+          </a:p>
+          <a:p>
+            <a:r>
+              <a:rPr lang="en-US" dirty="0" smtClean="0"/>
+              <a:t>The game stages will be limited unless it is possible to generate objects randomly.</a:t>
+            </a:r>
+          </a:p>
+          <a:p>
+            <a:endParaRPr lang="en-US" dirty="0" smtClean="0"/>
+          </a:p>
+          <a:p>
+            <a:r>
+              <a:rPr lang="en-US" dirty="0" smtClean="0"/>
+              <a:t>Game must be in a state such that game conditions are known or could receive messages from the server about </a:t>
+            </a:r>
+            <a:r>
+              <a:rPr lang="en-US" smtClean="0"/>
+              <a:t>game conditions.</a:t>
+            </a:r>
+            <a:endParaRPr lang="en-US" smtClean="0"/>
+          </a:p>
+        </p:txBody>
+      </p:sp>
+    </p:spTree>
+  </p:cSld>
+  <p:clrMapOvr>
+    <a:masterClrMapping/>
+  </p:clrMapOvr>
+  <p:transition spd="slow">
+    <p:fade/>
+  </p:transition>
+</p:sld>
+</file>
+
+<file path=ppt/slides/slide9.xml><?xml version="1.0" encoding="utf-8"?>
+<p:sld xmlns:a="http://schemas.openxmlformats.org/drawingml/2006/main" xmlns:r="http://schemas.openxmlformats.org/officeDocument/2006/relationships" xmlns:p="http://schemas.openxmlformats.org/presentationml/2006/main">
+  <p:cSld>
+    <p:spTree>
+      <p:nvGrpSpPr>
+        <p:cNvPr id="1" name=""/>
+        <p:cNvGrpSpPr/>
+        <p:nvPr/>
+      </p:nvGrpSpPr>
+      <p:grpSpPr>
+        <a:xfrm>
+          <a:off x="0" y="0"/>
+          <a:ext cx="0" cy="0"/>
+          <a:chOff x="0" y="0"/>
+          <a:chExt cx="0" cy="0"/>
+        </a:xfrm>
+      </p:grpSpPr>
+      <p:sp>
+        <p:nvSpPr>
+          <p:cNvPr id="2" name="Title 1"/>
+          <p:cNvSpPr>
+            <a:spLocks noGrp="1"/>
+          </p:cNvSpPr>
+          <p:nvPr>
+            <p:ph type="title"/>
+            <p:custDataLst>
+              <p:tags r:id="rId2"/>
+            </p:custDataLst>
+          </p:nvPr>
+        </p:nvSpPr>
+        <p:spPr/>
         <p:txBody>
           <a:bodyPr>
             <a:normAutofit/>
           </a:bodyPr>
           <a:lstStyle/>
           <a:p>
-            <a:pPr algn="ctr"/>
-            <a:r>
-              <a:rPr lang="en-US" sz="8000" b="1" dirty="0" smtClean="0"/>
-              <a:t>Questions?</a:t>
-            </a:r>
-            <a:endParaRPr lang="en-US" sz="8000" b="1" dirty="0"/>
+            <a:r>
+              <a:rPr lang="en-US" sz="6000" b="1" dirty="0" smtClean="0"/>
+              <a:t>Current Status</a:t>
+            </a:r>
+            <a:endParaRPr lang="en-US" sz="6000" b="1" dirty="0"/>
+          </a:p>
+        </p:txBody>
+      </p:sp>
+      <p:sp>
+        <p:nvSpPr>
+          <p:cNvPr id="4" name="Content Placeholder 3"/>
+          <p:cNvSpPr>
+            <a:spLocks noGrp="1"/>
+          </p:cNvSpPr>
+          <p:nvPr>
+            <p:ph idx="1"/>
+          </p:nvPr>
+        </p:nvSpPr>
+        <p:spPr/>
+        <p:txBody>
+          <a:bodyPr>
+            <a:normAutofit lnSpcReduction="10000"/>
+          </a:bodyPr>
+          <a:lstStyle/>
+          <a:p>
+            <a:pPr>
+              <a:lnSpc>
+                <a:spcPct val="150000"/>
+              </a:lnSpc>
+            </a:pPr>
+            <a:r>
+              <a:rPr lang="en-US" dirty="0" smtClean="0"/>
+              <a:t>Progress that </a:t>
+            </a:r>
+            <a:r>
+              <a:rPr lang="en-US" dirty="0"/>
+              <a:t>has been </a:t>
+            </a:r>
+            <a:r>
+              <a:rPr lang="en-US" dirty="0" smtClean="0"/>
+              <a:t>made:</a:t>
+            </a:r>
+            <a:endParaRPr lang="en-US" dirty="0"/>
+          </a:p>
+          <a:p>
+            <a:pPr lvl="1">
+              <a:lnSpc>
+                <a:spcPct val="150000"/>
+              </a:lnSpc>
+            </a:pPr>
+            <a:r>
+              <a:rPr lang="en-US" dirty="0" smtClean="0"/>
+              <a:t>Communication between Kinect and Second Life</a:t>
+            </a:r>
+            <a:endParaRPr lang="en-US" dirty="0"/>
+          </a:p>
+          <a:p>
+            <a:pPr lvl="1">
+              <a:lnSpc>
+                <a:spcPct val="150000"/>
+              </a:lnSpc>
+            </a:pPr>
+            <a:r>
+              <a:rPr lang="en-US" dirty="0" smtClean="0"/>
+              <a:t>Rudimentary gesture events written with corresponding actions in Second Life</a:t>
+            </a:r>
+            <a:endParaRPr lang="en-US" dirty="0"/>
+          </a:p>
+          <a:p>
+            <a:pPr>
+              <a:lnSpc>
+                <a:spcPct val="150000"/>
+              </a:lnSpc>
+            </a:pPr>
+            <a:r>
+              <a:rPr lang="en-US" dirty="0" smtClean="0"/>
+              <a:t>Next Steps:</a:t>
+            </a:r>
+            <a:endParaRPr lang="en-US" dirty="0"/>
+          </a:p>
+          <a:p>
+            <a:pPr lvl="1">
+              <a:lnSpc>
+                <a:spcPct val="150000"/>
+              </a:lnSpc>
+            </a:pPr>
+            <a:r>
+              <a:rPr lang="en-US" dirty="0" smtClean="0"/>
+              <a:t>Need to develop the game engine</a:t>
+            </a:r>
+          </a:p>
+          <a:p>
+            <a:pPr lvl="1">
+              <a:lnSpc>
+                <a:spcPct val="150000"/>
+              </a:lnSpc>
+            </a:pPr>
+            <a:r>
+              <a:rPr lang="en-US" dirty="0" smtClean="0"/>
+              <a:t>Need to develop complex gestures and voice recognition</a:t>
+            </a:r>
+            <a:endParaRPr lang="en-US" dirty="0"/>
+          </a:p>
+          <a:p>
+            <a:pPr marL="0" indent="0">
+              <a:buNone/>
+            </a:pPr>
+            <a:endParaRPr lang="en-US" dirty="0"/>
           </a:p>
         </p:txBody>
       </p:sp>
     </p:spTree>
-    <p:extLst>
-      <p:ext uri="{BB962C8B-B14F-4D97-AF65-F5344CB8AC3E}">
-        <p14:creationId xmlns:p14="http://schemas.microsoft.com/office/powerpoint/2010/main" val="1933149179"/>
-      </p:ext>
-    </p:extLst>
+    <p:custDataLst>
+      <p:tags r:id="rId1"/>
+    </p:custDataLst>
   </p:cSld>
   <p:clrMapOvr>
     <a:masterClrMapping/>
@@ -10985,19 +11575,19 @@
 
 <file path=ppt/tags/tag10.xml><?xml version="1.0" encoding="utf-8"?>
 <p:tagLst xmlns:a="http://schemas.openxmlformats.org/drawingml/2006/main" xmlns:r="http://schemas.openxmlformats.org/officeDocument/2006/relationships" xmlns:p="http://schemas.openxmlformats.org/presentationml/2006/main">
-  <p:tag name="DVSECTIONID" val="2oXR3Z3jBsekg7NRQLn8qd"/>
+  <p:tag name="DVSHAPEID" val="IaLJDTdCySrUB2DNXQJ7PB"/>
 </p:tagLst>
 </file>
 
 <file path=ppt/tags/tag11.xml><?xml version="1.0" encoding="utf-8"?>
 <p:tagLst xmlns:a="http://schemas.openxmlformats.org/drawingml/2006/main" xmlns:r="http://schemas.openxmlformats.org/officeDocument/2006/relationships" xmlns:p="http://schemas.openxmlformats.org/presentationml/2006/main">
-  <p:tag name="DVSHAPEID" val="tMKFWXxGAyYfCtF4ddJkuV"/>
+  <p:tag name="DVSECTIONID" val="FWTzd7aXBssOmYs9yuGiml"/>
 </p:tagLst>
 </file>
 
 <file path=ppt/tags/tag12.xml><?xml version="1.0" encoding="utf-8"?>
 <p:tagLst xmlns:a="http://schemas.openxmlformats.org/drawingml/2006/main" xmlns:r="http://schemas.openxmlformats.org/officeDocument/2006/relationships" xmlns:p="http://schemas.openxmlformats.org/presentationml/2006/main">
-  <p:tag name="DVSHAPEID" val="IaLJDTdCySrUB2DNXQJ7PB"/>
+  <p:tag name="DVSHAPEID" val="fEx7i1o5WFYMUt4c6svz0o"/>
 </p:tagLst>
 </file>
 
@@ -11039,13 +11629,13 @@
 
 <file path=ppt/tags/tag8.xml><?xml version="1.0" encoding="utf-8"?>
 <p:tagLst xmlns:a="http://schemas.openxmlformats.org/drawingml/2006/main" xmlns:r="http://schemas.openxmlformats.org/officeDocument/2006/relationships" xmlns:p="http://schemas.openxmlformats.org/presentationml/2006/main">
-  <p:tag name="DVSECTIONID" val="FWTzd7aXBssOmYs9yuGiml"/>
+  <p:tag name="DVSECTIONID" val="2oXR3Z3jBsekg7NRQLn8qd"/>
 </p:tagLst>
 </file>
 
 <file path=ppt/tags/tag9.xml><?xml version="1.0" encoding="utf-8"?>
 <p:tagLst xmlns:a="http://schemas.openxmlformats.org/drawingml/2006/main" xmlns:r="http://schemas.openxmlformats.org/officeDocument/2006/relationships" xmlns:p="http://schemas.openxmlformats.org/presentationml/2006/main">
-  <p:tag name="DVSHAPEID" val="fEx7i1o5WFYMUt4c6svz0o"/>
+  <p:tag name="DVSHAPEID" val="tMKFWXxGAyYfCtF4ddJkuV"/>
 </p:tagLst>
 </file>
 

</xml_diff>